<commit_message>
biggest update i ever seen
</commit_message>
<xml_diff>
--- a/Диссертация/Последние версии/Мансуров Презентация.pptx
+++ b/Диссертация/Последние версии/Мансуров Презентация.pptx
@@ -234,7 +234,7 @@
             <a:fld id="{8A2956D5-2046-4B16-B158-28749009537F}" type="datetimeFigureOut">
               <a:rPr lang="ru-RU" smtClean="0"/>
               <a:pPr/>
-              <a:t>31.05.2023</a:t>
+              <a:t>08.06.2023</a:t>
             </a:fld>
             <a:endParaRPr lang="ru-RU"/>
           </a:p>
@@ -635,7 +635,7 @@
             <a:fld id="{668F77C6-B837-4C28-B069-E60D1A7F8F4C}" type="datetime1">
               <a:rPr lang="ru-RU" smtClean="0"/>
               <a:pPr/>
-              <a:t>31.05.2023</a:t>
+              <a:t>08.06.2023</a:t>
             </a:fld>
             <a:endParaRPr lang="ru-RU"/>
           </a:p>
@@ -807,7 +807,7 @@
             <a:fld id="{E15233C2-C826-421D-8751-732F81C941BB}" type="datetime1">
               <a:rPr lang="ru-RU" smtClean="0"/>
               <a:pPr/>
-              <a:t>31.05.2023</a:t>
+              <a:t>08.06.2023</a:t>
             </a:fld>
             <a:endParaRPr lang="ru-RU"/>
           </a:p>
@@ -989,7 +989,7 @@
             <a:fld id="{F047989F-906F-40DE-BA90-D14E94A416BA}" type="datetime1">
               <a:rPr lang="ru-RU" smtClean="0"/>
               <a:pPr/>
-              <a:t>31.05.2023</a:t>
+              <a:t>08.06.2023</a:t>
             </a:fld>
             <a:endParaRPr lang="ru-RU"/>
           </a:p>
@@ -1161,7 +1161,7 @@
             <a:fld id="{D56CFF60-0E50-453A-81B9-424AB7DE66CD}" type="datetime1">
               <a:rPr lang="ru-RU" smtClean="0"/>
               <a:pPr/>
-              <a:t>31.05.2023</a:t>
+              <a:t>08.06.2023</a:t>
             </a:fld>
             <a:endParaRPr lang="ru-RU"/>
           </a:p>
@@ -1413,7 +1413,7 @@
             <a:fld id="{1EADCEAB-127F-4906-8280-7B6697A13E33}" type="datetime1">
               <a:rPr lang="ru-RU" smtClean="0"/>
               <a:pPr/>
-              <a:t>31.05.2023</a:t>
+              <a:t>08.06.2023</a:t>
             </a:fld>
             <a:endParaRPr lang="ru-RU"/>
           </a:p>
@@ -1647,7 +1647,7 @@
             <a:fld id="{772B70F3-DD83-40E6-8787-116CC1402285}" type="datetime1">
               <a:rPr lang="ru-RU" smtClean="0"/>
               <a:pPr/>
-              <a:t>31.05.2023</a:t>
+              <a:t>08.06.2023</a:t>
             </a:fld>
             <a:endParaRPr lang="ru-RU"/>
           </a:p>
@@ -2016,7 +2016,7 @@
             <a:fld id="{EFBC4BE1-28D4-4D8B-A423-5A2E1BA6934C}" type="datetime1">
               <a:rPr lang="ru-RU" smtClean="0"/>
               <a:pPr/>
-              <a:t>31.05.2023</a:t>
+              <a:t>08.06.2023</a:t>
             </a:fld>
             <a:endParaRPr lang="ru-RU"/>
           </a:p>
@@ -2136,7 +2136,7 @@
             <a:fld id="{6B7A375C-D316-441C-BBA4-36702FCEB310}" type="datetime1">
               <a:rPr lang="ru-RU" smtClean="0"/>
               <a:pPr/>
-              <a:t>31.05.2023</a:t>
+              <a:t>08.06.2023</a:t>
             </a:fld>
             <a:endParaRPr lang="ru-RU"/>
           </a:p>
@@ -2233,7 +2233,7 @@
             <a:fld id="{3EE6ABA4-7B05-4C08-9A73-CF8D6885218A}" type="datetime1">
               <a:rPr lang="ru-RU" smtClean="0"/>
               <a:pPr/>
-              <a:t>31.05.2023</a:t>
+              <a:t>08.06.2023</a:t>
             </a:fld>
             <a:endParaRPr lang="ru-RU"/>
           </a:p>
@@ -2512,7 +2512,7 @@
             <a:fld id="{F7A499FF-A70C-4AC7-8F4A-A5151C1A7370}" type="datetime1">
               <a:rPr lang="ru-RU" smtClean="0"/>
               <a:pPr/>
-              <a:t>31.05.2023</a:t>
+              <a:t>08.06.2023</a:t>
             </a:fld>
             <a:endParaRPr lang="ru-RU"/>
           </a:p>
@@ -2767,7 +2767,7 @@
             <a:fld id="{52FB4F09-8D8A-4907-99B4-463641EA0A07}" type="datetime1">
               <a:rPr lang="ru-RU" smtClean="0"/>
               <a:pPr/>
-              <a:t>31.05.2023</a:t>
+              <a:t>08.06.2023</a:t>
             </a:fld>
             <a:endParaRPr lang="ru-RU"/>
           </a:p>
@@ -2982,7 +2982,7 @@
             <a:fld id="{96489DF9-334F-4539-8237-D412EE1173F0}" type="datetime1">
               <a:rPr lang="ru-RU" smtClean="0"/>
               <a:pPr/>
-              <a:t>31.05.2023</a:t>
+              <a:t>08.06.2023</a:t>
             </a:fld>
             <a:endParaRPr lang="ru-RU"/>
           </a:p>
@@ -3634,7 +3634,7 @@
           <p:cNvPr id="4" name="Подзаголовок 6">
             <a:extLst>
               <a:ext uri="{FF2B5EF4-FFF2-40B4-BE49-F238E27FC236}">
-                <a16:creationId xmlns:a16="http://schemas.microsoft.com/office/drawing/2014/main" xmlns="" id="{6F08C3E7-B433-41C9-883D-917A98689EE1}"/>
+                <a16:creationId xmlns="" xmlns:a16="http://schemas.microsoft.com/office/drawing/2014/main" id="{6F08C3E7-B433-41C9-883D-917A98689EE1}"/>
               </a:ext>
             </a:extLst>
           </p:cNvPr>
@@ -3734,7 +3734,7 @@
           <p:cNvPr id="5" name="Подзаголовок 6">
             <a:extLst>
               <a:ext uri="{FF2B5EF4-FFF2-40B4-BE49-F238E27FC236}">
-                <a16:creationId xmlns:a16="http://schemas.microsoft.com/office/drawing/2014/main" xmlns="" id="{6F08C3E7-B433-41C9-883D-917A98689EE1}"/>
+                <a16:creationId xmlns="" xmlns:a16="http://schemas.microsoft.com/office/drawing/2014/main" id="{6F08C3E7-B433-41C9-883D-917A98689EE1}"/>
               </a:ext>
             </a:extLst>
           </p:cNvPr>
@@ -5445,7 +5445,7 @@
           <a:graphicData uri="http://schemas.openxmlformats.org/presentationml/2006/ole">
             <mc:AlternateContent xmlns:mc="http://schemas.openxmlformats.org/markup-compatibility/2006">
               <mc:Choice xmlns:v="urn:schemas-microsoft-com:vml" Requires="v">
-                <p:oleObj spid="_x0000_s46890" name="Формула" r:id="rId4" imgW="1688760" imgH="228600" progId="Equation.3">
+                <p:oleObj spid="_x0000_s46965" name="Формула" r:id="rId4" imgW="1688760" imgH="228600" progId="Equation.3">
                   <p:embed/>
                 </p:oleObj>
               </mc:Choice>
@@ -5638,28 +5638,28 @@
                 <a:gridCol w="957353">
                   <a:extLst>
                     <a:ext uri="{9D8B030D-6E8A-4147-A177-3AD203B41FA5}">
-                      <a16:colId xmlns:a16="http://schemas.microsoft.com/office/drawing/2014/main" xmlns="" val="1044631594"/>
+                      <a16:colId xmlns="" xmlns:a16="http://schemas.microsoft.com/office/drawing/2014/main" val="1044631594"/>
                     </a:ext>
                   </a:extLst>
                 </a:gridCol>
                 <a:gridCol w="957353">
                   <a:extLst>
                     <a:ext uri="{9D8B030D-6E8A-4147-A177-3AD203B41FA5}">
-                      <a16:colId xmlns:a16="http://schemas.microsoft.com/office/drawing/2014/main" xmlns="" val="2558395021"/>
+                      <a16:colId xmlns="" xmlns:a16="http://schemas.microsoft.com/office/drawing/2014/main" val="2558395021"/>
                     </a:ext>
                   </a:extLst>
                 </a:gridCol>
                 <a:gridCol w="957353">
                   <a:extLst>
                     <a:ext uri="{9D8B030D-6E8A-4147-A177-3AD203B41FA5}">
-                      <a16:colId xmlns:a16="http://schemas.microsoft.com/office/drawing/2014/main" xmlns="" val="2212677439"/>
+                      <a16:colId xmlns="" xmlns:a16="http://schemas.microsoft.com/office/drawing/2014/main" val="2212677439"/>
                     </a:ext>
                   </a:extLst>
                 </a:gridCol>
                 <a:gridCol w="957353">
                   <a:extLst>
                     <a:ext uri="{9D8B030D-6E8A-4147-A177-3AD203B41FA5}">
-                      <a16:colId xmlns:a16="http://schemas.microsoft.com/office/drawing/2014/main" xmlns="" val="851063209"/>
+                      <a16:colId xmlns="" xmlns:a16="http://schemas.microsoft.com/office/drawing/2014/main" val="851063209"/>
                     </a:ext>
                   </a:extLst>
                 </a:gridCol>
@@ -5723,7 +5723,7 @@
                 </a:tc>
                 <a:extLst>
                   <a:ext uri="{0D108BD9-81ED-4DB2-BD59-A6C34878D82A}">
-                    <a16:rowId xmlns:a16="http://schemas.microsoft.com/office/drawing/2014/main" xmlns="" val="1185514864"/>
+                    <a16:rowId xmlns="" xmlns:a16="http://schemas.microsoft.com/office/drawing/2014/main" val="1185514864"/>
                   </a:ext>
                 </a:extLst>
               </a:tr>
@@ -5876,7 +5876,7 @@
                 </a:tc>
                 <a:extLst>
                   <a:ext uri="{0D108BD9-81ED-4DB2-BD59-A6C34878D82A}">
-                    <a16:rowId xmlns:a16="http://schemas.microsoft.com/office/drawing/2014/main" xmlns="" val="10001"/>
+                    <a16:rowId xmlns="" xmlns:a16="http://schemas.microsoft.com/office/drawing/2014/main" val="10001"/>
                   </a:ext>
                 </a:extLst>
               </a:tr>
@@ -6166,7 +6166,7 @@
                 </a:tc>
                 <a:extLst>
                   <a:ext uri="{0D108BD9-81ED-4DB2-BD59-A6C34878D82A}">
-                    <a16:rowId xmlns:a16="http://schemas.microsoft.com/office/drawing/2014/main" xmlns="" val="627226478"/>
+                    <a16:rowId xmlns="" xmlns:a16="http://schemas.microsoft.com/office/drawing/2014/main" val="627226478"/>
                   </a:ext>
                 </a:extLst>
               </a:tr>
@@ -6336,7 +6336,7 @@
                 </a:tc>
                 <a:extLst>
                   <a:ext uri="{0D108BD9-81ED-4DB2-BD59-A6C34878D82A}">
-                    <a16:rowId xmlns:a16="http://schemas.microsoft.com/office/drawing/2014/main" xmlns="" val="10003"/>
+                    <a16:rowId xmlns="" xmlns:a16="http://schemas.microsoft.com/office/drawing/2014/main" val="10003"/>
                   </a:ext>
                 </a:extLst>
               </a:tr>
@@ -6366,7 +6366,7 @@
           <a:graphicData uri="http://schemas.openxmlformats.org/presentationml/2006/ole">
             <mc:AlternateContent xmlns:mc="http://schemas.openxmlformats.org/markup-compatibility/2006">
               <mc:Choice xmlns:v="urn:schemas-microsoft-com:vml" Requires="v">
-                <p:oleObj spid="_x0000_s46891" name="Уравнение" r:id="rId6" imgW="406080" imgH="190440" progId="Equation.3">
+                <p:oleObj spid="_x0000_s46966" name="Уравнение" r:id="rId6" imgW="406080" imgH="190440" progId="Equation.3">
                   <p:embed/>
                 </p:oleObj>
               </mc:Choice>
@@ -6436,7 +6436,7 @@
           <a:graphicData uri="http://schemas.openxmlformats.org/presentationml/2006/ole">
             <mc:AlternateContent xmlns:mc="http://schemas.openxmlformats.org/markup-compatibility/2006">
               <mc:Choice xmlns:v="urn:schemas-microsoft-com:vml" Requires="v">
-                <p:oleObj spid="_x0000_s46892" name="Уравнение" r:id="rId8" imgW="419040" imgH="215640" progId="Equation.3">
+                <p:oleObj spid="_x0000_s46967" name="Уравнение" r:id="rId8" imgW="419040" imgH="215640" progId="Equation.3">
                   <p:embed/>
                 </p:oleObj>
               </mc:Choice>
@@ -6506,7 +6506,7 @@
           <a:graphicData uri="http://schemas.openxmlformats.org/presentationml/2006/ole">
             <mc:AlternateContent xmlns:mc="http://schemas.openxmlformats.org/markup-compatibility/2006">
               <mc:Choice xmlns:v="urn:schemas-microsoft-com:vml" Requires="v">
-                <p:oleObj spid="_x0000_s46893" name="Формула" r:id="rId10" imgW="419040" imgH="215640" progId="Equation.3">
+                <p:oleObj spid="_x0000_s46968" name="Формула" r:id="rId10" imgW="419040" imgH="215640" progId="Equation.3">
                   <p:embed/>
                 </p:oleObj>
               </mc:Choice>
@@ -6576,7 +6576,7 @@
           <a:graphicData uri="http://schemas.openxmlformats.org/presentationml/2006/ole">
             <mc:AlternateContent xmlns:mc="http://schemas.openxmlformats.org/markup-compatibility/2006">
               <mc:Choice xmlns:v="urn:schemas-microsoft-com:vml" Requires="v">
-                <p:oleObj spid="_x0000_s46894" name="Формула" r:id="rId12" imgW="304560" imgH="215640" progId="Equation.3">
+                <p:oleObj spid="_x0000_s46969" name="Формула" r:id="rId12" imgW="304560" imgH="215640" progId="Equation.3">
                   <p:embed/>
                 </p:oleObj>
               </mc:Choice>
@@ -6737,7 +6737,7 @@
           <a:graphicData uri="http://schemas.openxmlformats.org/presentationml/2006/ole">
             <mc:AlternateContent xmlns:mc="http://schemas.openxmlformats.org/markup-compatibility/2006">
               <mc:Choice xmlns:v="urn:schemas-microsoft-com:vml" Requires="v">
-                <p:oleObj spid="_x0000_s46895" name="Формула" r:id="rId14" imgW="799920" imgH="228600" progId="Equation.3">
+                <p:oleObj spid="_x0000_s46970" name="Формула" r:id="rId14" imgW="799920" imgH="228600" progId="Equation.3">
                   <p:embed/>
                 </p:oleObj>
               </mc:Choice>
@@ -6794,7 +6794,7 @@
           <a:graphicData uri="http://schemas.openxmlformats.org/presentationml/2006/ole">
             <mc:AlternateContent xmlns:mc="http://schemas.openxmlformats.org/markup-compatibility/2006">
               <mc:Choice xmlns:v="urn:schemas-microsoft-com:vml" Requires="v">
-                <p:oleObj spid="_x0000_s46896" name="Equation" r:id="rId16" imgW="838080" imgH="215640" progId="Equation.3">
+                <p:oleObj spid="_x0000_s46971" name="Equation" r:id="rId16" imgW="838080" imgH="215640" progId="Equation.3">
                   <p:embed/>
                 </p:oleObj>
               </mc:Choice>
@@ -6879,7 +6879,7 @@
               <a:graphicData uri="http://schemas.openxmlformats.org/presentationml/2006/ole">
                 <mc:AlternateContent xmlns:mc="http://schemas.openxmlformats.org/markup-compatibility/2006">
                   <mc:Choice xmlns:v="urn:schemas-microsoft-com:vml" Requires="v">
-                    <p:oleObj spid="_x0000_s46897" name="Уравнение" r:id="rId18" imgW="228600" imgH="228600" progId="Equation.3">
+                    <p:oleObj spid="_x0000_s46972" name="Уравнение" r:id="rId18" imgW="228600" imgH="228600" progId="Equation.3">
                       <p:embed/>
                     </p:oleObj>
                   </mc:Choice>
@@ -6949,7 +6949,7 @@
               <a:graphicData uri="http://schemas.openxmlformats.org/presentationml/2006/ole">
                 <mc:AlternateContent xmlns:mc="http://schemas.openxmlformats.org/markup-compatibility/2006">
                   <mc:Choice xmlns:v="urn:schemas-microsoft-com:vml" Requires="v">
-                    <p:oleObj spid="_x0000_s46898" name="Формула" r:id="rId20" imgW="164885" imgH="164885" progId="Equation.3">
+                    <p:oleObj spid="_x0000_s46973" name="Формула" r:id="rId20" imgW="164885" imgH="164885" progId="Equation.3">
                       <p:embed/>
                     </p:oleObj>
                   </mc:Choice>
@@ -7136,7 +7136,7 @@
                     <a:graphicData uri="http://schemas.openxmlformats.org/presentationml/2006/ole">
                       <mc:AlternateContent xmlns:mc="http://schemas.openxmlformats.org/markup-compatibility/2006">
                         <mc:Choice xmlns:v="urn:schemas-microsoft-com:vml" Requires="v">
-                          <p:oleObj spid="_x0000_s46899" name="Уравнение" r:id="rId22" imgW="164880" imgH="228600" progId="Equation.3">
+                          <p:oleObj spid="_x0000_s46974" name="Уравнение" r:id="rId22" imgW="164880" imgH="228600" progId="Equation.3">
                             <p:embed/>
                           </p:oleObj>
                         </mc:Choice>
@@ -7206,7 +7206,7 @@
                     <a:graphicData uri="http://schemas.openxmlformats.org/presentationml/2006/ole">
                       <mc:AlternateContent xmlns:mc="http://schemas.openxmlformats.org/markup-compatibility/2006">
                         <mc:Choice xmlns:v="urn:schemas-microsoft-com:vml" Requires="v">
-                          <p:oleObj spid="_x0000_s46900" name="Equation" r:id="rId24" imgW="228600" imgH="228600" progId="Equation.3">
+                          <p:oleObj spid="_x0000_s46975" name="Equation" r:id="rId24" imgW="228600" imgH="228600" progId="Equation.3">
                             <p:embed/>
                           </p:oleObj>
                         </mc:Choice>
@@ -7276,7 +7276,7 @@
                     <a:graphicData uri="http://schemas.openxmlformats.org/presentationml/2006/ole">
                       <mc:AlternateContent xmlns:mc="http://schemas.openxmlformats.org/markup-compatibility/2006">
                         <mc:Choice xmlns:v="urn:schemas-microsoft-com:vml" Requires="v">
-                          <p:oleObj spid="_x0000_s46901" name="Equation" r:id="rId26" imgW="215640" imgH="228600" progId="Equation.3">
+                          <p:oleObj spid="_x0000_s46976" name="Equation" r:id="rId26" imgW="215640" imgH="228600" progId="Equation.3">
                             <p:embed/>
                           </p:oleObj>
                         </mc:Choice>
@@ -7867,7 +7867,7 @@
                       <a:graphicData uri="http://schemas.openxmlformats.org/presentationml/2006/ole">
                         <mc:AlternateContent xmlns:mc="http://schemas.openxmlformats.org/markup-compatibility/2006">
                           <mc:Choice xmlns:v="urn:schemas-microsoft-com:vml" Requires="v">
-                            <p:oleObj spid="_x0000_s46902" name="Уравнение" r:id="rId28" imgW="203040" imgH="215640" progId="Equation.3">
+                            <p:oleObj spid="_x0000_s46977" name="Уравнение" r:id="rId28" imgW="203040" imgH="215640" progId="Equation.3">
                               <p:embed/>
                             </p:oleObj>
                           </mc:Choice>
@@ -8289,7 +8289,7 @@
           <a:graphicData uri="http://schemas.openxmlformats.org/presentationml/2006/ole">
             <mc:AlternateContent xmlns:mc="http://schemas.openxmlformats.org/markup-compatibility/2006">
               <mc:Choice xmlns:v="urn:schemas-microsoft-com:vml" Requires="v">
-                <p:oleObj spid="_x0000_s46903" name="Формула" r:id="rId30" imgW="1091880" imgH="228600" progId="Equation.3">
+                <p:oleObj spid="_x0000_s46978" name="Формула" r:id="rId30" imgW="1091880" imgH="228600" progId="Equation.3">
                   <p:embed/>
                 </p:oleObj>
               </mc:Choice>
@@ -8359,7 +8359,7 @@
           <a:graphicData uri="http://schemas.openxmlformats.org/presentationml/2006/ole">
             <mc:AlternateContent xmlns:mc="http://schemas.openxmlformats.org/markup-compatibility/2006">
               <mc:Choice xmlns:v="urn:schemas-microsoft-com:vml" Requires="v">
-                <p:oleObj spid="_x0000_s46904" name="Уравнение" r:id="rId32" imgW="1904760" imgH="228600" progId="Equation.3">
+                <p:oleObj spid="_x0000_s46979" name="Уравнение" r:id="rId32" imgW="1904760" imgH="228600" progId="Equation.3">
                   <p:embed/>
                 </p:oleObj>
               </mc:Choice>
@@ -9445,17 +9445,7 @@
                 <a:latin typeface="Bookman Old Style" pitchFamily="18" charset="0"/>
                 <a:cs typeface="Times New Roman" panose="02020603050405020304" pitchFamily="18" charset="0"/>
               </a:rPr>
-              <a:t>МОДЕЛИРУЕМ</a:t>
-            </a:r>
-            <a:r>
-              <a:rPr lang="ru-RU" sz="1200" cap="small" dirty="0" smtClean="0">
-                <a:solidFill>
-                  <a:srgbClr val="292929"/>
-                </a:solidFill>
-                <a:latin typeface="Bookman Old Style" pitchFamily="18" charset="0"/>
-                <a:cs typeface="Times New Roman" panose="02020603050405020304" pitchFamily="18" charset="0"/>
-              </a:rPr>
-              <a:t>ОЕ ОРУДИЕ</a:t>
+              <a:t>МОДЕЛИРУЕМОЕ ОРУДИЕ</a:t>
             </a:r>
             <a:endParaRPr lang="ru-RU" sz="1200" cap="small" dirty="0">
               <a:solidFill>
@@ -9710,28 +9700,28 @@
                 <a:gridCol w="1371600">
                   <a:extLst>
                     <a:ext uri="{9D8B030D-6E8A-4147-A177-3AD203B41FA5}">
-                      <a16:colId xmlns:a16="http://schemas.microsoft.com/office/drawing/2014/main" xmlns="" val="20000"/>
+                      <a16:colId xmlns="" xmlns:a16="http://schemas.microsoft.com/office/drawing/2014/main" val="20000"/>
                     </a:ext>
                   </a:extLst>
                 </a:gridCol>
                 <a:gridCol w="1003082">
                   <a:extLst>
                     <a:ext uri="{9D8B030D-6E8A-4147-A177-3AD203B41FA5}">
-                      <a16:colId xmlns:a16="http://schemas.microsoft.com/office/drawing/2014/main" xmlns="" val="20001"/>
+                      <a16:colId xmlns="" xmlns:a16="http://schemas.microsoft.com/office/drawing/2014/main" val="20001"/>
                     </a:ext>
                   </a:extLst>
                 </a:gridCol>
                 <a:gridCol w="1187341">
                   <a:extLst>
                     <a:ext uri="{9D8B030D-6E8A-4147-A177-3AD203B41FA5}">
-                      <a16:colId xmlns:a16="http://schemas.microsoft.com/office/drawing/2014/main" xmlns="" val="20002"/>
+                      <a16:colId xmlns="" xmlns:a16="http://schemas.microsoft.com/office/drawing/2014/main" val="20002"/>
                     </a:ext>
                   </a:extLst>
                 </a:gridCol>
                 <a:gridCol w="1187341">
                   <a:extLst>
                     <a:ext uri="{9D8B030D-6E8A-4147-A177-3AD203B41FA5}">
-                      <a16:colId xmlns:a16="http://schemas.microsoft.com/office/drawing/2014/main" xmlns="" val="20003"/>
+                      <a16:colId xmlns="" xmlns:a16="http://schemas.microsoft.com/office/drawing/2014/main" val="20003"/>
                     </a:ext>
                   </a:extLst>
                 </a:gridCol>
@@ -9879,7 +9869,7 @@
                 </a:tc>
                 <a:extLst>
                   <a:ext uri="{0D108BD9-81ED-4DB2-BD59-A6C34878D82A}">
-                    <a16:rowId xmlns:a16="http://schemas.microsoft.com/office/drawing/2014/main" xmlns="" val="10000"/>
+                    <a16:rowId xmlns="" xmlns:a16="http://schemas.microsoft.com/office/drawing/2014/main" val="10000"/>
                   </a:ext>
                 </a:extLst>
               </a:tr>
@@ -10036,7 +10026,7 @@
                 </a:tc>
                 <a:extLst>
                   <a:ext uri="{0D108BD9-81ED-4DB2-BD59-A6C34878D82A}">
-                    <a16:rowId xmlns:a16="http://schemas.microsoft.com/office/drawing/2014/main" xmlns="" val="10001"/>
+                    <a16:rowId xmlns="" xmlns:a16="http://schemas.microsoft.com/office/drawing/2014/main" val="10001"/>
                   </a:ext>
                 </a:extLst>
               </a:tr>
@@ -10168,7 +10158,7 @@
                 </a:tc>
                 <a:extLst>
                   <a:ext uri="{0D108BD9-81ED-4DB2-BD59-A6C34878D82A}">
-                    <a16:rowId xmlns:a16="http://schemas.microsoft.com/office/drawing/2014/main" xmlns="" val="10002"/>
+                    <a16:rowId xmlns="" xmlns:a16="http://schemas.microsoft.com/office/drawing/2014/main" val="10002"/>
                   </a:ext>
                 </a:extLst>
               </a:tr>
@@ -10307,7 +10297,7 @@
                 </a:tc>
                 <a:extLst>
                   <a:ext uri="{0D108BD9-81ED-4DB2-BD59-A6C34878D82A}">
-                    <a16:rowId xmlns:a16="http://schemas.microsoft.com/office/drawing/2014/main" xmlns="" val="10003"/>
+                    <a16:rowId xmlns="" xmlns:a16="http://schemas.microsoft.com/office/drawing/2014/main" val="10003"/>
                   </a:ext>
                 </a:extLst>
               </a:tr>
@@ -10436,7 +10426,7 @@
                 </a:tc>
                 <a:extLst>
                   <a:ext uri="{0D108BD9-81ED-4DB2-BD59-A6C34878D82A}">
-                    <a16:rowId xmlns:a16="http://schemas.microsoft.com/office/drawing/2014/main" xmlns="" val="10004"/>
+                    <a16:rowId xmlns="" xmlns:a16="http://schemas.microsoft.com/office/drawing/2014/main" val="10004"/>
                   </a:ext>
                 </a:extLst>
               </a:tr>
@@ -10568,7 +10558,7 @@
                 </a:tc>
                 <a:extLst>
                   <a:ext uri="{0D108BD9-81ED-4DB2-BD59-A6C34878D82A}">
-                    <a16:rowId xmlns:a16="http://schemas.microsoft.com/office/drawing/2014/main" xmlns="" val="10005"/>
+                    <a16:rowId xmlns="" xmlns:a16="http://schemas.microsoft.com/office/drawing/2014/main" val="10005"/>
                   </a:ext>
                 </a:extLst>
               </a:tr>
@@ -10692,7 +10682,7 @@
                 </a:tc>
                 <a:extLst>
                   <a:ext uri="{0D108BD9-81ED-4DB2-BD59-A6C34878D82A}">
-                    <a16:rowId xmlns:a16="http://schemas.microsoft.com/office/drawing/2014/main" xmlns="" val="10006"/>
+                    <a16:rowId xmlns="" xmlns:a16="http://schemas.microsoft.com/office/drawing/2014/main" val="10006"/>
                   </a:ext>
                 </a:extLst>
               </a:tr>
@@ -10832,7 +10822,7 @@
                 </a:tc>
                 <a:extLst>
                   <a:ext uri="{0D108BD9-81ED-4DB2-BD59-A6C34878D82A}">
-                    <a16:rowId xmlns:a16="http://schemas.microsoft.com/office/drawing/2014/main" xmlns="" val="10007"/>
+                    <a16:rowId xmlns="" xmlns:a16="http://schemas.microsoft.com/office/drawing/2014/main" val="10007"/>
                   </a:ext>
                 </a:extLst>
               </a:tr>
@@ -10972,7 +10962,7 @@
                 </a:tc>
                 <a:extLst>
                   <a:ext uri="{0D108BD9-81ED-4DB2-BD59-A6C34878D82A}">
-                    <a16:rowId xmlns:a16="http://schemas.microsoft.com/office/drawing/2014/main" xmlns="" val="10008"/>
+                    <a16:rowId xmlns="" xmlns:a16="http://schemas.microsoft.com/office/drawing/2014/main" val="10008"/>
                   </a:ext>
                 </a:extLst>
               </a:tr>
@@ -11057,28 +11047,28 @@
                 <a:gridCol w="1072141">
                   <a:extLst>
                     <a:ext uri="{9D8B030D-6E8A-4147-A177-3AD203B41FA5}">
-                      <a16:colId xmlns:a16="http://schemas.microsoft.com/office/drawing/2014/main" xmlns="" val="20000"/>
+                      <a16:colId xmlns="" xmlns:a16="http://schemas.microsoft.com/office/drawing/2014/main" val="20000"/>
                     </a:ext>
                   </a:extLst>
                 </a:gridCol>
                 <a:gridCol w="933277">
                   <a:extLst>
                     <a:ext uri="{9D8B030D-6E8A-4147-A177-3AD203B41FA5}">
-                      <a16:colId xmlns:a16="http://schemas.microsoft.com/office/drawing/2014/main" xmlns="" val="20001"/>
+                      <a16:colId xmlns="" xmlns:a16="http://schemas.microsoft.com/office/drawing/2014/main" val="20001"/>
                     </a:ext>
                   </a:extLst>
                 </a:gridCol>
                 <a:gridCol w="1002709">
                   <a:extLst>
                     <a:ext uri="{9D8B030D-6E8A-4147-A177-3AD203B41FA5}">
-                      <a16:colId xmlns:a16="http://schemas.microsoft.com/office/drawing/2014/main" xmlns="" val="20002"/>
+                      <a16:colId xmlns="" xmlns:a16="http://schemas.microsoft.com/office/drawing/2014/main" val="20002"/>
                     </a:ext>
                   </a:extLst>
                 </a:gridCol>
                 <a:gridCol w="1002709">
                   <a:extLst>
                     <a:ext uri="{9D8B030D-6E8A-4147-A177-3AD203B41FA5}">
-                      <a16:colId xmlns:a16="http://schemas.microsoft.com/office/drawing/2014/main" xmlns="" val="20003"/>
+                      <a16:colId xmlns="" xmlns:a16="http://schemas.microsoft.com/office/drawing/2014/main" val="20003"/>
                     </a:ext>
                   </a:extLst>
                 </a:gridCol>
@@ -11226,7 +11216,7 @@
                 </a:tc>
                 <a:extLst>
                   <a:ext uri="{0D108BD9-81ED-4DB2-BD59-A6C34878D82A}">
-                    <a16:rowId xmlns:a16="http://schemas.microsoft.com/office/drawing/2014/main" xmlns="" val="10000"/>
+                    <a16:rowId xmlns="" xmlns:a16="http://schemas.microsoft.com/office/drawing/2014/main" val="10000"/>
                   </a:ext>
                 </a:extLst>
               </a:tr>
@@ -11365,7 +11355,7 @@
                 </a:tc>
                 <a:extLst>
                   <a:ext uri="{0D108BD9-81ED-4DB2-BD59-A6C34878D82A}">
-                    <a16:rowId xmlns:a16="http://schemas.microsoft.com/office/drawing/2014/main" xmlns="" val="10001"/>
+                    <a16:rowId xmlns="" xmlns:a16="http://schemas.microsoft.com/office/drawing/2014/main" val="10001"/>
                   </a:ext>
                 </a:extLst>
               </a:tr>
@@ -11504,7 +11494,7 @@
                 </a:tc>
                 <a:extLst>
                   <a:ext uri="{0D108BD9-81ED-4DB2-BD59-A6C34878D82A}">
-                    <a16:rowId xmlns:a16="http://schemas.microsoft.com/office/drawing/2014/main" xmlns="" val="10002"/>
+                    <a16:rowId xmlns="" xmlns:a16="http://schemas.microsoft.com/office/drawing/2014/main" val="10002"/>
                   </a:ext>
                 </a:extLst>
               </a:tr>
@@ -11647,7 +11637,7 @@
                 </a:tc>
                 <a:extLst>
                   <a:ext uri="{0D108BD9-81ED-4DB2-BD59-A6C34878D82A}">
-                    <a16:rowId xmlns:a16="http://schemas.microsoft.com/office/drawing/2014/main" xmlns="" val="10004"/>
+                    <a16:rowId xmlns="" xmlns:a16="http://schemas.microsoft.com/office/drawing/2014/main" val="10004"/>
                   </a:ext>
                 </a:extLst>
               </a:tr>
@@ -12622,28 +12612,28 @@
                 <a:gridCol w="1002709">
                   <a:extLst>
                     <a:ext uri="{9D8B030D-6E8A-4147-A177-3AD203B41FA5}">
-                      <a16:colId xmlns:a16="http://schemas.microsoft.com/office/drawing/2014/main" xmlns="" val="20000"/>
+                      <a16:colId xmlns="" xmlns:a16="http://schemas.microsoft.com/office/drawing/2014/main" val="20000"/>
                     </a:ext>
                   </a:extLst>
                 </a:gridCol>
                 <a:gridCol w="1002709">
                   <a:extLst>
                     <a:ext uri="{9D8B030D-6E8A-4147-A177-3AD203B41FA5}">
-                      <a16:colId xmlns:a16="http://schemas.microsoft.com/office/drawing/2014/main" xmlns="" val="20001"/>
+                      <a16:colId xmlns="" xmlns:a16="http://schemas.microsoft.com/office/drawing/2014/main" val="20001"/>
                     </a:ext>
                   </a:extLst>
                 </a:gridCol>
                 <a:gridCol w="1002709">
                   <a:extLst>
                     <a:ext uri="{9D8B030D-6E8A-4147-A177-3AD203B41FA5}">
-                      <a16:colId xmlns:a16="http://schemas.microsoft.com/office/drawing/2014/main" xmlns="" val="20002"/>
+                      <a16:colId xmlns="" xmlns:a16="http://schemas.microsoft.com/office/drawing/2014/main" val="20002"/>
                     </a:ext>
                   </a:extLst>
                 </a:gridCol>
                 <a:gridCol w="1002709">
                   <a:extLst>
                     <a:ext uri="{9D8B030D-6E8A-4147-A177-3AD203B41FA5}">
-                      <a16:colId xmlns:a16="http://schemas.microsoft.com/office/drawing/2014/main" xmlns="" val="20003"/>
+                      <a16:colId xmlns="" xmlns:a16="http://schemas.microsoft.com/office/drawing/2014/main" val="20003"/>
                     </a:ext>
                   </a:extLst>
                 </a:gridCol>
@@ -12791,7 +12781,7 @@
                 </a:tc>
                 <a:extLst>
                   <a:ext uri="{0D108BD9-81ED-4DB2-BD59-A6C34878D82A}">
-                    <a16:rowId xmlns:a16="http://schemas.microsoft.com/office/drawing/2014/main" xmlns="" val="10000"/>
+                    <a16:rowId xmlns="" xmlns:a16="http://schemas.microsoft.com/office/drawing/2014/main" val="10000"/>
                   </a:ext>
                 </a:extLst>
               </a:tr>
@@ -12930,7 +12920,7 @@
                 </a:tc>
                 <a:extLst>
                   <a:ext uri="{0D108BD9-81ED-4DB2-BD59-A6C34878D82A}">
-                    <a16:rowId xmlns:a16="http://schemas.microsoft.com/office/drawing/2014/main" xmlns="" val="10001"/>
+                    <a16:rowId xmlns="" xmlns:a16="http://schemas.microsoft.com/office/drawing/2014/main" val="10001"/>
                   </a:ext>
                 </a:extLst>
               </a:tr>
@@ -13069,7 +13059,7 @@
                 </a:tc>
                 <a:extLst>
                   <a:ext uri="{0D108BD9-81ED-4DB2-BD59-A6C34878D82A}">
-                    <a16:rowId xmlns:a16="http://schemas.microsoft.com/office/drawing/2014/main" xmlns="" val="10002"/>
+                    <a16:rowId xmlns="" xmlns:a16="http://schemas.microsoft.com/office/drawing/2014/main" val="10002"/>
                   </a:ext>
                 </a:extLst>
               </a:tr>
@@ -13213,7 +13203,7 @@
                 </a:tc>
                 <a:extLst>
                   <a:ext uri="{0D108BD9-81ED-4DB2-BD59-A6C34878D82A}">
-                    <a16:rowId xmlns:a16="http://schemas.microsoft.com/office/drawing/2014/main" xmlns="" val="10004"/>
+                    <a16:rowId xmlns="" xmlns:a16="http://schemas.microsoft.com/office/drawing/2014/main" val="10004"/>
                   </a:ext>
                 </a:extLst>
               </a:tr>
@@ -13298,28 +13288,28 @@
                 <a:gridCol w="1002709">
                   <a:extLst>
                     <a:ext uri="{9D8B030D-6E8A-4147-A177-3AD203B41FA5}">
-                      <a16:colId xmlns:a16="http://schemas.microsoft.com/office/drawing/2014/main" xmlns="" val="20000"/>
+                      <a16:colId xmlns="" xmlns:a16="http://schemas.microsoft.com/office/drawing/2014/main" val="20000"/>
                     </a:ext>
                   </a:extLst>
                 </a:gridCol>
                 <a:gridCol w="1002709">
                   <a:extLst>
                     <a:ext uri="{9D8B030D-6E8A-4147-A177-3AD203B41FA5}">
-                      <a16:colId xmlns:a16="http://schemas.microsoft.com/office/drawing/2014/main" xmlns="" val="20001"/>
+                      <a16:colId xmlns="" xmlns:a16="http://schemas.microsoft.com/office/drawing/2014/main" val="20001"/>
                     </a:ext>
                   </a:extLst>
                 </a:gridCol>
                 <a:gridCol w="1002709">
                   <a:extLst>
                     <a:ext uri="{9D8B030D-6E8A-4147-A177-3AD203B41FA5}">
-                      <a16:colId xmlns:a16="http://schemas.microsoft.com/office/drawing/2014/main" xmlns="" val="20002"/>
+                      <a16:colId xmlns="" xmlns:a16="http://schemas.microsoft.com/office/drawing/2014/main" val="20002"/>
                     </a:ext>
                   </a:extLst>
                 </a:gridCol>
                 <a:gridCol w="1002709">
                   <a:extLst>
                     <a:ext uri="{9D8B030D-6E8A-4147-A177-3AD203B41FA5}">
-                      <a16:colId xmlns:a16="http://schemas.microsoft.com/office/drawing/2014/main" xmlns="" val="20003"/>
+                      <a16:colId xmlns="" xmlns:a16="http://schemas.microsoft.com/office/drawing/2014/main" val="20003"/>
                     </a:ext>
                   </a:extLst>
                 </a:gridCol>
@@ -13467,7 +13457,7 @@
                 </a:tc>
                 <a:extLst>
                   <a:ext uri="{0D108BD9-81ED-4DB2-BD59-A6C34878D82A}">
-                    <a16:rowId xmlns:a16="http://schemas.microsoft.com/office/drawing/2014/main" xmlns="" val="10000"/>
+                    <a16:rowId xmlns="" xmlns:a16="http://schemas.microsoft.com/office/drawing/2014/main" val="10000"/>
                   </a:ext>
                 </a:extLst>
               </a:tr>
@@ -13606,7 +13596,7 @@
                 </a:tc>
                 <a:extLst>
                   <a:ext uri="{0D108BD9-81ED-4DB2-BD59-A6C34878D82A}">
-                    <a16:rowId xmlns:a16="http://schemas.microsoft.com/office/drawing/2014/main" xmlns="" val="10001"/>
+                    <a16:rowId xmlns="" xmlns:a16="http://schemas.microsoft.com/office/drawing/2014/main" val="10001"/>
                   </a:ext>
                 </a:extLst>
               </a:tr>
@@ -13745,7 +13735,7 @@
                 </a:tc>
                 <a:extLst>
                   <a:ext uri="{0D108BD9-81ED-4DB2-BD59-A6C34878D82A}">
-                    <a16:rowId xmlns:a16="http://schemas.microsoft.com/office/drawing/2014/main" xmlns="" val="10002"/>
+                    <a16:rowId xmlns="" xmlns:a16="http://schemas.microsoft.com/office/drawing/2014/main" val="10002"/>
                   </a:ext>
                 </a:extLst>
               </a:tr>
@@ -13888,7 +13878,7 @@
                 </a:tc>
                 <a:extLst>
                   <a:ext uri="{0D108BD9-81ED-4DB2-BD59-A6C34878D82A}">
-                    <a16:rowId xmlns:a16="http://schemas.microsoft.com/office/drawing/2014/main" xmlns="" val="10004"/>
+                    <a16:rowId xmlns="" xmlns:a16="http://schemas.microsoft.com/office/drawing/2014/main" val="10004"/>
                   </a:ext>
                 </a:extLst>
               </a:tr>
@@ -14884,7 +14874,7 @@
           <a:graphicData uri="http://schemas.openxmlformats.org/presentationml/2006/ole">
             <mc:AlternateContent xmlns:mc="http://schemas.openxmlformats.org/markup-compatibility/2006">
               <mc:Choice xmlns:v="urn:schemas-microsoft-com:vml" Requires="v">
-                <p:oleObj spid="_x0000_s42361" name="Уравнение" r:id="rId3" imgW="812520" imgH="482400" progId="Equation.3">
+                <p:oleObj spid="_x0000_s42381" name="Уравнение" r:id="rId3" imgW="812520" imgH="482400" progId="Equation.3">
                   <p:embed/>
                 </p:oleObj>
               </mc:Choice>
@@ -15064,7 +15054,7 @@
           <a:graphicData uri="http://schemas.openxmlformats.org/presentationml/2006/ole">
             <mc:AlternateContent xmlns:mc="http://schemas.openxmlformats.org/markup-compatibility/2006">
               <mc:Choice xmlns:v="urn:schemas-microsoft-com:vml" Requires="v">
-                <p:oleObj spid="_x0000_s42362" name="Уравнение" r:id="rId5" imgW="787320" imgH="507960" progId="Equation.3">
+                <p:oleObj spid="_x0000_s42382" name="Уравнение" r:id="rId5" imgW="787320" imgH="507960" progId="Equation.3">
                   <p:embed/>
                 </p:oleObj>
               </mc:Choice>
@@ -15121,7 +15111,7 @@
           <a:graphicData uri="http://schemas.openxmlformats.org/presentationml/2006/ole">
             <mc:AlternateContent xmlns:mc="http://schemas.openxmlformats.org/markup-compatibility/2006">
               <mc:Choice xmlns:v="urn:schemas-microsoft-com:vml" Requires="v">
-                <p:oleObj spid="_x0000_s42363" name="Уравнение" r:id="rId7" imgW="977760" imgH="520560" progId="Equation.3">
+                <p:oleObj spid="_x0000_s42383" name="Уравнение" r:id="rId7" imgW="977760" imgH="520560" progId="Equation.3">
                   <p:embed/>
                 </p:oleObj>
               </mc:Choice>
@@ -15308,7 +15298,7 @@
           <a:graphicData uri="http://schemas.openxmlformats.org/presentationml/2006/ole">
             <mc:AlternateContent xmlns:mc="http://schemas.openxmlformats.org/markup-compatibility/2006">
               <mc:Choice xmlns:v="urn:schemas-microsoft-com:vml" Requires="v">
-                <p:oleObj spid="_x0000_s42364" name="Уравнение" r:id="rId9" imgW="812520" imgH="203040" progId="Equation.3">
+                <p:oleObj spid="_x0000_s42384" name="Уравнение" r:id="rId9" imgW="812520" imgH="203040" progId="Equation.3">
                   <p:embed/>
                 </p:oleObj>
               </mc:Choice>
@@ -16303,15 +16293,7 @@
                 <a:ea typeface="Times New Roman" pitchFamily="18" charset="0"/>
                 <a:cs typeface="Times New Roman" pitchFamily="18" charset="0"/>
               </a:rPr>
-              <a:t>. </a:t>
-            </a:r>
-            <a:r>
-              <a:rPr lang="ru-RU" sz="1100" dirty="0" smtClean="0">
-                <a:latin typeface="Times New Roman" pitchFamily="18" charset="0"/>
-                <a:ea typeface="Times New Roman" pitchFamily="18" charset="0"/>
-                <a:cs typeface="Times New Roman" pitchFamily="18" charset="0"/>
-              </a:rPr>
-              <a:t>Изменение начальной скорости в зависимости от массы</a:t>
+              <a:t>. Изменение начальной скорости в зависимости от массы</a:t>
             </a:r>
             <a:endParaRPr lang="ru-RU" sz="1100" dirty="0"/>
           </a:p>
@@ -16345,28 +16327,28 @@
                 <a:gridCol w="875899">
                   <a:extLst>
                     <a:ext uri="{9D8B030D-6E8A-4147-A177-3AD203B41FA5}">
-                      <a16:colId xmlns:a16="http://schemas.microsoft.com/office/drawing/2014/main" xmlns="" val="20000"/>
+                      <a16:colId xmlns="" xmlns:a16="http://schemas.microsoft.com/office/drawing/2014/main" val="20000"/>
                     </a:ext>
                   </a:extLst>
                 </a:gridCol>
                 <a:gridCol w="875899">
                   <a:extLst>
                     <a:ext uri="{9D8B030D-6E8A-4147-A177-3AD203B41FA5}">
-                      <a16:colId xmlns:a16="http://schemas.microsoft.com/office/drawing/2014/main" xmlns="" val="20001"/>
+                      <a16:colId xmlns="" xmlns:a16="http://schemas.microsoft.com/office/drawing/2014/main" val="20001"/>
                     </a:ext>
                   </a:extLst>
                 </a:gridCol>
                 <a:gridCol w="875899">
                   <a:extLst>
                     <a:ext uri="{9D8B030D-6E8A-4147-A177-3AD203B41FA5}">
-                      <a16:colId xmlns:a16="http://schemas.microsoft.com/office/drawing/2014/main" xmlns="" val="20002"/>
+                      <a16:colId xmlns="" xmlns:a16="http://schemas.microsoft.com/office/drawing/2014/main" val="20002"/>
                     </a:ext>
                   </a:extLst>
                 </a:gridCol>
                 <a:gridCol w="875899">
                   <a:extLst>
                     <a:ext uri="{9D8B030D-6E8A-4147-A177-3AD203B41FA5}">
-                      <a16:colId xmlns:a16="http://schemas.microsoft.com/office/drawing/2014/main" xmlns="" val="20003"/>
+                      <a16:colId xmlns="" xmlns:a16="http://schemas.microsoft.com/office/drawing/2014/main" val="20003"/>
                     </a:ext>
                   </a:extLst>
                 </a:gridCol>
@@ -16664,7 +16646,7 @@
                 </a:tc>
                 <a:extLst>
                   <a:ext uri="{0D108BD9-81ED-4DB2-BD59-A6C34878D82A}">
-                    <a16:rowId xmlns:a16="http://schemas.microsoft.com/office/drawing/2014/main" xmlns="" val="10000"/>
+                    <a16:rowId xmlns="" xmlns:a16="http://schemas.microsoft.com/office/drawing/2014/main" val="10000"/>
                   </a:ext>
                 </a:extLst>
               </a:tr>
@@ -16948,7 +16930,7 @@
                 </a:tc>
                 <a:extLst>
                   <a:ext uri="{0D108BD9-81ED-4DB2-BD59-A6C34878D82A}">
-                    <a16:rowId xmlns:a16="http://schemas.microsoft.com/office/drawing/2014/main" xmlns="" val="10001"/>
+                    <a16:rowId xmlns="" xmlns:a16="http://schemas.microsoft.com/office/drawing/2014/main" val="10001"/>
                   </a:ext>
                 </a:extLst>
               </a:tr>
@@ -17239,7 +17221,7 @@
                 </a:tc>
                 <a:extLst>
                   <a:ext uri="{0D108BD9-81ED-4DB2-BD59-A6C34878D82A}">
-                    <a16:rowId xmlns:a16="http://schemas.microsoft.com/office/drawing/2014/main" xmlns="" val="63189236"/>
+                    <a16:rowId xmlns="" xmlns:a16="http://schemas.microsoft.com/office/drawing/2014/main" val="63189236"/>
                   </a:ext>
                 </a:extLst>
               </a:tr>
@@ -17290,15 +17272,7 @@
                 <a:ea typeface="Times New Roman" pitchFamily="18" charset="0"/>
                 <a:cs typeface="Times New Roman" pitchFamily="18" charset="0"/>
               </a:rPr>
-              <a:t>. </a:t>
-            </a:r>
-            <a:r>
-              <a:rPr lang="ru-RU" sz="1100" dirty="0" smtClean="0">
-                <a:latin typeface="Times New Roman" pitchFamily="18" charset="0"/>
-                <a:ea typeface="Times New Roman" pitchFamily="18" charset="0"/>
-                <a:cs typeface="Times New Roman" pitchFamily="18" charset="0"/>
-              </a:rPr>
-              <a:t>Зависимость дальности от массы топлива</a:t>
+              <a:t>. Зависимость дальности от массы топлива</a:t>
             </a:r>
             <a:endParaRPr lang="ru-RU" sz="1100" dirty="0"/>
           </a:p>
@@ -17356,28 +17330,28 @@
                 <a:gridCol w="875899">
                   <a:extLst>
                     <a:ext uri="{9D8B030D-6E8A-4147-A177-3AD203B41FA5}">
-                      <a16:colId xmlns:a16="http://schemas.microsoft.com/office/drawing/2014/main" xmlns="" val="20000"/>
+                      <a16:colId xmlns="" xmlns:a16="http://schemas.microsoft.com/office/drawing/2014/main" val="20000"/>
                     </a:ext>
                   </a:extLst>
                 </a:gridCol>
                 <a:gridCol w="875899">
                   <a:extLst>
                     <a:ext uri="{9D8B030D-6E8A-4147-A177-3AD203B41FA5}">
-                      <a16:colId xmlns:a16="http://schemas.microsoft.com/office/drawing/2014/main" xmlns="" val="20001"/>
+                      <a16:colId xmlns="" xmlns:a16="http://schemas.microsoft.com/office/drawing/2014/main" val="20001"/>
                     </a:ext>
                   </a:extLst>
                 </a:gridCol>
                 <a:gridCol w="875899">
                   <a:extLst>
                     <a:ext uri="{9D8B030D-6E8A-4147-A177-3AD203B41FA5}">
-                      <a16:colId xmlns:a16="http://schemas.microsoft.com/office/drawing/2014/main" xmlns="" val="20002"/>
+                      <a16:colId xmlns="" xmlns:a16="http://schemas.microsoft.com/office/drawing/2014/main" val="20002"/>
                     </a:ext>
                   </a:extLst>
                 </a:gridCol>
                 <a:gridCol w="875899">
                   <a:extLst>
                     <a:ext uri="{9D8B030D-6E8A-4147-A177-3AD203B41FA5}">
-                      <a16:colId xmlns:a16="http://schemas.microsoft.com/office/drawing/2014/main" xmlns="" val="20003"/>
+                      <a16:colId xmlns="" xmlns:a16="http://schemas.microsoft.com/office/drawing/2014/main" val="20003"/>
                     </a:ext>
                   </a:extLst>
                 </a:gridCol>
@@ -17686,7 +17660,7 @@
                 </a:tc>
                 <a:extLst>
                   <a:ext uri="{0D108BD9-81ED-4DB2-BD59-A6C34878D82A}">
-                    <a16:rowId xmlns:a16="http://schemas.microsoft.com/office/drawing/2014/main" xmlns="" val="10000"/>
+                    <a16:rowId xmlns="" xmlns:a16="http://schemas.microsoft.com/office/drawing/2014/main" val="10000"/>
                   </a:ext>
                 </a:extLst>
               </a:tr>
@@ -17971,7 +17945,7 @@
                 </a:tc>
                 <a:extLst>
                   <a:ext uri="{0D108BD9-81ED-4DB2-BD59-A6C34878D82A}">
-                    <a16:rowId xmlns:a16="http://schemas.microsoft.com/office/drawing/2014/main" xmlns="" val="10001"/>
+                    <a16:rowId xmlns="" xmlns:a16="http://schemas.microsoft.com/office/drawing/2014/main" val="10001"/>
                   </a:ext>
                 </a:extLst>
               </a:tr>
@@ -18300,7 +18274,7 @@
                 </a:tc>
                 <a:extLst>
                   <a:ext uri="{0D108BD9-81ED-4DB2-BD59-A6C34878D82A}">
-                    <a16:rowId xmlns:a16="http://schemas.microsoft.com/office/drawing/2014/main" xmlns="" val="10002"/>
+                    <a16:rowId xmlns="" xmlns:a16="http://schemas.microsoft.com/office/drawing/2014/main" val="10002"/>
                   </a:ext>
                 </a:extLst>
               </a:tr>
@@ -19100,35 +19074,35 @@
                 <a:gridCol w="766125">
                   <a:extLst>
                     <a:ext uri="{9D8B030D-6E8A-4147-A177-3AD203B41FA5}">
-                      <a16:colId xmlns:a16="http://schemas.microsoft.com/office/drawing/2014/main" xmlns="" val="20000"/>
+                      <a16:colId xmlns="" xmlns:a16="http://schemas.microsoft.com/office/drawing/2014/main" val="20000"/>
                     </a:ext>
                   </a:extLst>
                 </a:gridCol>
                 <a:gridCol w="766125">
                   <a:extLst>
                     <a:ext uri="{9D8B030D-6E8A-4147-A177-3AD203B41FA5}">
-                      <a16:colId xmlns:a16="http://schemas.microsoft.com/office/drawing/2014/main" xmlns="" val="20001"/>
+                      <a16:colId xmlns="" xmlns:a16="http://schemas.microsoft.com/office/drawing/2014/main" val="20001"/>
                     </a:ext>
                   </a:extLst>
                 </a:gridCol>
                 <a:gridCol w="766125">
                   <a:extLst>
                     <a:ext uri="{9D8B030D-6E8A-4147-A177-3AD203B41FA5}">
-                      <a16:colId xmlns:a16="http://schemas.microsoft.com/office/drawing/2014/main" xmlns="" val="20002"/>
+                      <a16:colId xmlns="" xmlns:a16="http://schemas.microsoft.com/office/drawing/2014/main" val="20002"/>
                     </a:ext>
                   </a:extLst>
                 </a:gridCol>
                 <a:gridCol w="766125">
                   <a:extLst>
                     <a:ext uri="{9D8B030D-6E8A-4147-A177-3AD203B41FA5}">
-                      <a16:colId xmlns:a16="http://schemas.microsoft.com/office/drawing/2014/main" xmlns="" val="20004"/>
+                      <a16:colId xmlns="" xmlns:a16="http://schemas.microsoft.com/office/drawing/2014/main" val="20004"/>
                     </a:ext>
                   </a:extLst>
                 </a:gridCol>
                 <a:gridCol w="766125">
                   <a:extLst>
                     <a:ext uri="{9D8B030D-6E8A-4147-A177-3AD203B41FA5}">
-                      <a16:colId xmlns:a16="http://schemas.microsoft.com/office/drawing/2014/main" xmlns="" val="20003"/>
+                      <a16:colId xmlns="" xmlns:a16="http://schemas.microsoft.com/office/drawing/2014/main" val="20003"/>
                     </a:ext>
                   </a:extLst>
                 </a:gridCol>
@@ -19268,7 +19242,7 @@
                 </a:tc>
                 <a:extLst>
                   <a:ext uri="{0D108BD9-81ED-4DB2-BD59-A6C34878D82A}">
-                    <a16:rowId xmlns:a16="http://schemas.microsoft.com/office/drawing/2014/main" xmlns="" val="3277355946"/>
+                    <a16:rowId xmlns="" xmlns:a16="http://schemas.microsoft.com/office/drawing/2014/main" val="3277355946"/>
                   </a:ext>
                 </a:extLst>
               </a:tr>
@@ -19407,7 +19381,7 @@
                 </a:tc>
                 <a:extLst>
                   <a:ext uri="{0D108BD9-81ED-4DB2-BD59-A6C34878D82A}">
-                    <a16:rowId xmlns:a16="http://schemas.microsoft.com/office/drawing/2014/main" xmlns="" val="10000"/>
+                    <a16:rowId xmlns="" xmlns:a16="http://schemas.microsoft.com/office/drawing/2014/main" val="10000"/>
                   </a:ext>
                 </a:extLst>
               </a:tr>
@@ -19534,7 +19508,7 @@
                 </a:tc>
                 <a:extLst>
                   <a:ext uri="{0D108BD9-81ED-4DB2-BD59-A6C34878D82A}">
-                    <a16:rowId xmlns:a16="http://schemas.microsoft.com/office/drawing/2014/main" xmlns="" val="10001"/>
+                    <a16:rowId xmlns="" xmlns:a16="http://schemas.microsoft.com/office/drawing/2014/main" val="10001"/>
                   </a:ext>
                 </a:extLst>
               </a:tr>
@@ -19619,35 +19593,35 @@
                 <a:gridCol w="875899">
                   <a:extLst>
                     <a:ext uri="{9D8B030D-6E8A-4147-A177-3AD203B41FA5}">
-                      <a16:colId xmlns:a16="http://schemas.microsoft.com/office/drawing/2014/main" xmlns="" val="20000"/>
+                      <a16:colId xmlns="" xmlns:a16="http://schemas.microsoft.com/office/drawing/2014/main" val="20000"/>
                     </a:ext>
                   </a:extLst>
                 </a:gridCol>
                 <a:gridCol w="752776">
                   <a:extLst>
                     <a:ext uri="{9D8B030D-6E8A-4147-A177-3AD203B41FA5}">
-                      <a16:colId xmlns:a16="http://schemas.microsoft.com/office/drawing/2014/main" xmlns="" val="20001"/>
+                      <a16:colId xmlns="" xmlns:a16="http://schemas.microsoft.com/office/drawing/2014/main" val="20001"/>
                     </a:ext>
                   </a:extLst>
                 </a:gridCol>
                 <a:gridCol w="861060">
                   <a:extLst>
                     <a:ext uri="{9D8B030D-6E8A-4147-A177-3AD203B41FA5}">
-                      <a16:colId xmlns:a16="http://schemas.microsoft.com/office/drawing/2014/main" xmlns="" val="20002"/>
+                      <a16:colId xmlns="" xmlns:a16="http://schemas.microsoft.com/office/drawing/2014/main" val="20002"/>
                     </a:ext>
                   </a:extLst>
                 </a:gridCol>
                 <a:gridCol w="899160">
                   <a:extLst>
                     <a:ext uri="{9D8B030D-6E8A-4147-A177-3AD203B41FA5}">
-                      <a16:colId xmlns:a16="http://schemas.microsoft.com/office/drawing/2014/main" xmlns="" val="20003"/>
+                      <a16:colId xmlns="" xmlns:a16="http://schemas.microsoft.com/office/drawing/2014/main" val="20003"/>
                     </a:ext>
                   </a:extLst>
                 </a:gridCol>
                 <a:gridCol w="990600">
                   <a:extLst>
                     <a:ext uri="{9D8B030D-6E8A-4147-A177-3AD203B41FA5}">
-                      <a16:colId xmlns:a16="http://schemas.microsoft.com/office/drawing/2014/main" xmlns="" val="20004"/>
+                      <a16:colId xmlns="" xmlns:a16="http://schemas.microsoft.com/office/drawing/2014/main" val="20004"/>
                     </a:ext>
                   </a:extLst>
                 </a:gridCol>
@@ -19895,7 +19869,7 @@
                 </a:tc>
                 <a:extLst>
                   <a:ext uri="{0D108BD9-81ED-4DB2-BD59-A6C34878D82A}">
-                    <a16:rowId xmlns:a16="http://schemas.microsoft.com/office/drawing/2014/main" xmlns="" val="2278183065"/>
+                    <a16:rowId xmlns="" xmlns:a16="http://schemas.microsoft.com/office/drawing/2014/main" val="2278183065"/>
                   </a:ext>
                 </a:extLst>
               </a:tr>
@@ -20042,7 +20016,7 @@
                 </a:tc>
                 <a:extLst>
                   <a:ext uri="{0D108BD9-81ED-4DB2-BD59-A6C34878D82A}">
-                    <a16:rowId xmlns:a16="http://schemas.microsoft.com/office/drawing/2014/main" xmlns="" val="10001"/>
+                    <a16:rowId xmlns="" xmlns:a16="http://schemas.microsoft.com/office/drawing/2014/main" val="10001"/>
                   </a:ext>
                 </a:extLst>
               </a:tr>
@@ -20072,7 +20046,7 @@
           <a:graphicData uri="http://schemas.openxmlformats.org/presentationml/2006/ole">
             <mc:AlternateContent xmlns:mc="http://schemas.openxmlformats.org/markup-compatibility/2006">
               <mc:Choice xmlns:v="urn:schemas-microsoft-com:vml" Requires="v">
-                <p:oleObj spid="_x0000_s52369" name="Формула" r:id="rId3" imgW="266400" imgH="228600" progId="Equation.3">
+                <p:oleObj spid="_x0000_s52384" name="Формула" r:id="rId3" imgW="266400" imgH="228600" progId="Equation.3">
                   <p:embed/>
                 </p:oleObj>
               </mc:Choice>
@@ -20134,7 +20108,7 @@
           <a:graphicData uri="http://schemas.openxmlformats.org/presentationml/2006/ole">
             <mc:AlternateContent xmlns:mc="http://schemas.openxmlformats.org/markup-compatibility/2006">
               <mc:Choice xmlns:v="urn:schemas-microsoft-com:vml" Requires="v">
-                <p:oleObj spid="_x0000_s52370" name="Формула" r:id="rId5" imgW="558720" imgH="228600" progId="Equation.3">
+                <p:oleObj spid="_x0000_s52385" name="Формула" r:id="rId5" imgW="558720" imgH="228600" progId="Equation.3">
                   <p:embed/>
                 </p:oleObj>
               </mc:Choice>
@@ -20196,7 +20170,7 @@
           <a:graphicData uri="http://schemas.openxmlformats.org/presentationml/2006/ole">
             <mc:AlternateContent xmlns:mc="http://schemas.openxmlformats.org/markup-compatibility/2006">
               <mc:Choice xmlns:v="urn:schemas-microsoft-com:vml" Requires="v">
-                <p:oleObj spid="_x0000_s52371" name="Формула" r:id="rId7" imgW="330057" imgH="203112" progId="">
+                <p:oleObj spid="_x0000_s52386" name="Формула" r:id="rId7" imgW="330057" imgH="203112" progId="">
                   <p:embed/>
                 </p:oleObj>
               </mc:Choice>
@@ -22790,7 +22764,7 @@
           <p:nvPr>
             <p:extLst>
               <p:ext uri="{D42A27DB-BD31-4B8C-83A1-F6EECF244321}">
-                <p14:modId xmlns:p14="http://schemas.microsoft.com/office/powerpoint/2010/main" val="2934309940"/>
+                <p14:modId xmlns:p14="http://schemas.microsoft.com/office/powerpoint/2010/main" val="1818554236"/>
               </p:ext>
             </p:extLst>
           </p:nvPr>
@@ -22809,49 +22783,49 @@
                 <a:gridCol w="885562">
                   <a:extLst>
                     <a:ext uri="{9D8B030D-6E8A-4147-A177-3AD203B41FA5}">
-                      <a16:colId xmlns:a16="http://schemas.microsoft.com/office/drawing/2014/main" xmlns="" val="20000"/>
+                      <a16:colId xmlns="" xmlns:a16="http://schemas.microsoft.com/office/drawing/2014/main" val="20000"/>
                     </a:ext>
                   </a:extLst>
                 </a:gridCol>
                 <a:gridCol w="1016848">
                   <a:extLst>
                     <a:ext uri="{9D8B030D-6E8A-4147-A177-3AD203B41FA5}">
-                      <a16:colId xmlns:a16="http://schemas.microsoft.com/office/drawing/2014/main" xmlns="" val="20001"/>
+                      <a16:colId xmlns="" xmlns:a16="http://schemas.microsoft.com/office/drawing/2014/main" val="20001"/>
                     </a:ext>
                   </a:extLst>
                 </a:gridCol>
                 <a:gridCol w="844766">
                   <a:extLst>
                     <a:ext uri="{9D8B030D-6E8A-4147-A177-3AD203B41FA5}">
-                      <a16:colId xmlns:a16="http://schemas.microsoft.com/office/drawing/2014/main" xmlns="" val="20002"/>
+                      <a16:colId xmlns="" xmlns:a16="http://schemas.microsoft.com/office/drawing/2014/main" val="20002"/>
                     </a:ext>
                   </a:extLst>
                 </a:gridCol>
                 <a:gridCol w="790012">
                   <a:extLst>
                     <a:ext uri="{9D8B030D-6E8A-4147-A177-3AD203B41FA5}">
-                      <a16:colId xmlns:a16="http://schemas.microsoft.com/office/drawing/2014/main" xmlns="" val="20003"/>
+                      <a16:colId xmlns="" xmlns:a16="http://schemas.microsoft.com/office/drawing/2014/main" val="20003"/>
                     </a:ext>
                   </a:extLst>
                 </a:gridCol>
                 <a:gridCol w="915163">
                   <a:extLst>
                     <a:ext uri="{9D8B030D-6E8A-4147-A177-3AD203B41FA5}">
-                      <a16:colId xmlns:a16="http://schemas.microsoft.com/office/drawing/2014/main" xmlns="" val="20004"/>
+                      <a16:colId xmlns="" xmlns:a16="http://schemas.microsoft.com/office/drawing/2014/main" val="20004"/>
                     </a:ext>
                   </a:extLst>
                 </a:gridCol>
                 <a:gridCol w="797834">
                   <a:extLst>
                     <a:ext uri="{9D8B030D-6E8A-4147-A177-3AD203B41FA5}">
-                      <a16:colId xmlns:a16="http://schemas.microsoft.com/office/drawing/2014/main" xmlns="" val="20006"/>
+                      <a16:colId xmlns="" xmlns:a16="http://schemas.microsoft.com/office/drawing/2014/main" val="20006"/>
                     </a:ext>
                   </a:extLst>
                 </a:gridCol>
                 <a:gridCol w="841243">
                   <a:extLst>
                     <a:ext uri="{9D8B030D-6E8A-4147-A177-3AD203B41FA5}">
-                      <a16:colId xmlns:a16="http://schemas.microsoft.com/office/drawing/2014/main" xmlns="" val="20005"/>
+                      <a16:colId xmlns="" xmlns:a16="http://schemas.microsoft.com/office/drawing/2014/main" val="20005"/>
                     </a:ext>
                   </a:extLst>
                 </a:gridCol>
@@ -23066,7 +23040,7 @@
                 </a:tc>
                 <a:extLst>
                   <a:ext uri="{0D108BD9-81ED-4DB2-BD59-A6C34878D82A}">
-                    <a16:rowId xmlns:a16="http://schemas.microsoft.com/office/drawing/2014/main" xmlns="" val="10000"/>
+                    <a16:rowId xmlns="" xmlns:a16="http://schemas.microsoft.com/office/drawing/2014/main" val="10000"/>
                   </a:ext>
                 </a:extLst>
               </a:tr>
@@ -23251,7 +23225,7 @@
                 </a:tc>
                 <a:extLst>
                   <a:ext uri="{0D108BD9-81ED-4DB2-BD59-A6C34878D82A}">
-                    <a16:rowId xmlns:a16="http://schemas.microsoft.com/office/drawing/2014/main" xmlns="" val="10001"/>
+                    <a16:rowId xmlns="" xmlns:a16="http://schemas.microsoft.com/office/drawing/2014/main" val="10001"/>
                   </a:ext>
                 </a:extLst>
               </a:tr>
@@ -23396,7 +23370,7 @@
                 </a:tc>
                 <a:extLst>
                   <a:ext uri="{0D108BD9-81ED-4DB2-BD59-A6C34878D82A}">
-                    <a16:rowId xmlns:a16="http://schemas.microsoft.com/office/drawing/2014/main" xmlns="" val="10002"/>
+                    <a16:rowId xmlns="" xmlns:a16="http://schemas.microsoft.com/office/drawing/2014/main" val="10002"/>
                   </a:ext>
                 </a:extLst>
               </a:tr>
@@ -23540,7 +23514,7 @@
                     <a:p>
                       <a:pPr algn="ctr"/>
                       <a:r>
-                        <a:rPr lang="ru-RU" sz="1000" b="0" i="0" kern="1200" dirty="0" smtClean="0">
+                        <a:rPr lang="en-US" sz="1000" b="0" i="0" kern="1200" dirty="0" smtClean="0">
                           <a:solidFill>
                             <a:schemeClr val="tx1"/>
                           </a:solidFill>
@@ -23549,7 +23523,7 @@
                           <a:ea typeface="+mn-ea"/>
                           <a:cs typeface="+mn-cs"/>
                         </a:rPr>
-                        <a:t>797</a:t>
+                        <a:t>830</a:t>
                       </a:r>
                       <a:endParaRPr lang="ru-RU" sz="1000" dirty="0">
                         <a:latin typeface="Bookman Old Style" panose="02050604050505020204" pitchFamily="18" charset="0"/>
@@ -23603,7 +23577,19 @@
                         <a:rPr lang="ru-RU" sz="1000" dirty="0" smtClean="0">
                           <a:latin typeface="Bookman Old Style" panose="02050604050505020204" pitchFamily="18" charset="0"/>
                         </a:rPr>
-                        <a:t>22,5</a:t>
+                        <a:t>2</a:t>
+                      </a:r>
+                      <a:r>
+                        <a:rPr lang="en-US" sz="1000" dirty="0" smtClean="0">
+                          <a:latin typeface="Bookman Old Style" panose="02050604050505020204" pitchFamily="18" charset="0"/>
+                        </a:rPr>
+                        <a:t>3</a:t>
+                      </a:r>
+                      <a:r>
+                        <a:rPr lang="ru-RU" sz="1000" dirty="0" smtClean="0">
+                          <a:latin typeface="Bookman Old Style" panose="02050604050505020204" pitchFamily="18" charset="0"/>
+                        </a:rPr>
+                        <a:t>,5</a:t>
                       </a:r>
                     </a:p>
                     <a:p>
@@ -23617,7 +23603,7 @@
                 </a:tc>
                 <a:extLst>
                   <a:ext uri="{0D108BD9-81ED-4DB2-BD59-A6C34878D82A}">
-                    <a16:rowId xmlns:a16="http://schemas.microsoft.com/office/drawing/2014/main" xmlns="" val="10004"/>
+                    <a16:rowId xmlns="" xmlns:a16="http://schemas.microsoft.com/office/drawing/2014/main" val="10004"/>
                   </a:ext>
                 </a:extLst>
               </a:tr>
@@ -23696,7 +23682,55 @@
                           <a:ea typeface="+mn-ea"/>
                           <a:cs typeface="+mn-cs"/>
                         </a:rPr>
-                        <a:t>45,50</a:t>
+                        <a:t>4</a:t>
+                      </a:r>
+                      <a:r>
+                        <a:rPr lang="en-US" sz="1000" b="0" i="0" kern="1200" dirty="0" smtClean="0">
+                          <a:solidFill>
+                            <a:schemeClr val="tx1"/>
+                          </a:solidFill>
+                          <a:effectLst/>
+                          <a:latin typeface="Bookman Old Style" panose="02050604050505020204" pitchFamily="18" charset="0"/>
+                          <a:ea typeface="+mn-ea"/>
+                          <a:cs typeface="+mn-cs"/>
+                        </a:rPr>
+                        <a:t>8</a:t>
+                      </a:r>
+                      <a:r>
+                        <a:rPr lang="ru-RU" sz="1000" b="0" i="0" kern="1200" dirty="0" smtClean="0">
+                          <a:solidFill>
+                            <a:schemeClr val="tx1"/>
+                          </a:solidFill>
+                          <a:effectLst/>
+                          <a:latin typeface="Bookman Old Style" panose="02050604050505020204" pitchFamily="18" charset="0"/>
+                          <a:ea typeface="+mn-ea"/>
+                          <a:cs typeface="+mn-cs"/>
+                        </a:rPr>
+                        <a:t>,</a:t>
+                      </a:r>
+                      <a:r>
+                        <a:rPr lang="en-US" sz="1000" b="0" i="0" kern="1200" dirty="0" smtClean="0">
+                          <a:solidFill>
+                            <a:schemeClr val="tx1"/>
+                          </a:solidFill>
+                          <a:effectLst/>
+                          <a:latin typeface="Bookman Old Style" panose="02050604050505020204" pitchFamily="18" charset="0"/>
+                          <a:ea typeface="+mn-ea"/>
+                          <a:cs typeface="+mn-cs"/>
+                        </a:rPr>
+                        <a:t>0</a:t>
+                      </a:r>
+                      <a:r>
+                        <a:rPr lang="ru-RU" sz="1000" b="0" i="0" kern="1200" dirty="0" smtClean="0">
+                          <a:solidFill>
+                            <a:schemeClr val="tx1"/>
+                          </a:solidFill>
+                          <a:effectLst/>
+                          <a:latin typeface="Bookman Old Style" panose="02050604050505020204" pitchFamily="18" charset="0"/>
+                          <a:ea typeface="+mn-ea"/>
+                          <a:cs typeface="+mn-cs"/>
+                        </a:rPr>
+                        <a:t>0</a:t>
                       </a:r>
                       <a:endParaRPr lang="ru-RU" sz="1000" dirty="0">
                         <a:latin typeface="Bookman Old Style" panose="02050604050505020204" pitchFamily="18" charset="0"/>
@@ -23712,7 +23746,7 @@
                     <a:p>
                       <a:pPr algn="ctr"/>
                       <a:r>
-                        <a:rPr lang="ru-RU" sz="1000" b="0" i="0" kern="1200" dirty="0" smtClean="0">
+                        <a:rPr lang="en-US" sz="1000" b="0" i="0" kern="1200" dirty="0" smtClean="0">
                           <a:solidFill>
                             <a:schemeClr val="tx1"/>
                           </a:solidFill>
@@ -23721,9 +23755,12 @@
                           <a:ea typeface="+mn-ea"/>
                           <a:cs typeface="+mn-cs"/>
                         </a:rPr>
-                        <a:t>1000</a:t>
+                        <a:t>800</a:t>
                       </a:r>
                       <a:endParaRPr lang="ru-RU" sz="1000" dirty="0">
+                        <a:solidFill>
+                          <a:schemeClr val="tx1"/>
+                        </a:solidFill>
                         <a:latin typeface="Bookman Old Style" panose="02050604050505020204" pitchFamily="18" charset="0"/>
                       </a:endParaRPr>
                     </a:p>
@@ -23770,7 +23807,7 @@
                 </a:tc>
                 <a:extLst>
                   <a:ext uri="{0D108BD9-81ED-4DB2-BD59-A6C34878D82A}">
-                    <a16:rowId xmlns:a16="http://schemas.microsoft.com/office/drawing/2014/main" xmlns="" val="10005"/>
+                    <a16:rowId xmlns="" xmlns:a16="http://schemas.microsoft.com/office/drawing/2014/main" val="10005"/>
                   </a:ext>
                 </a:extLst>
               </a:tr>
@@ -23872,10 +23909,10 @@
                     <a:p>
                       <a:pPr algn="ctr"/>
                       <a:r>
-                        <a:rPr lang="ru-RU" sz="1000" dirty="0" smtClean="0">
+                        <a:rPr lang="en-US" sz="1000" dirty="0" smtClean="0">
                           <a:latin typeface="Bookman Old Style" panose="02050604050505020204" pitchFamily="18" charset="0"/>
                         </a:rPr>
-                        <a:t>45,54</a:t>
+                        <a:t>44</a:t>
                       </a:r>
                       <a:endParaRPr lang="ru-RU" sz="1000" dirty="0">
                         <a:latin typeface="Bookman Old Style" panose="02050604050505020204" pitchFamily="18" charset="0"/>
@@ -23891,12 +23928,18 @@
                     <a:p>
                       <a:pPr algn="ctr"/>
                       <a:r>
-                        <a:rPr lang="ru-RU" sz="1000" dirty="0" smtClean="0">
+                        <a:rPr lang="en-US" sz="1000" dirty="0" smtClean="0">
+                          <a:solidFill>
+                            <a:schemeClr val="tx1"/>
+                          </a:solidFill>
                           <a:latin typeface="Bookman Old Style" panose="02050604050505020204" pitchFamily="18" charset="0"/>
                         </a:rPr>
-                        <a:t>897</a:t>
+                        <a:t>950</a:t>
                       </a:r>
                       <a:endParaRPr lang="ru-RU" sz="1000" dirty="0">
+                        <a:solidFill>
+                          <a:schemeClr val="tx1"/>
+                        </a:solidFill>
                         <a:latin typeface="Bookman Old Style" panose="02050604050505020204" pitchFamily="18" charset="0"/>
                       </a:endParaRPr>
                     </a:p>
@@ -23929,12 +23972,18 @@
                     <a:p>
                       <a:pPr algn="ctr"/>
                       <a:r>
-                        <a:rPr lang="ru-RU" sz="1000" dirty="0" smtClean="0">
+                        <a:rPr lang="en-US" sz="1000" dirty="0" smtClean="0">
+                          <a:solidFill>
+                            <a:schemeClr val="tx1"/>
+                          </a:solidFill>
                           <a:latin typeface="Bookman Old Style" panose="02050604050505020204" pitchFamily="18" charset="0"/>
                         </a:rPr>
-                        <a:t>30</a:t>
+                        <a:t>32</a:t>
                       </a:r>
                       <a:endParaRPr lang="ru-RU" sz="1000" dirty="0">
+                        <a:solidFill>
+                          <a:schemeClr val="tx1"/>
+                        </a:solidFill>
                         <a:latin typeface="Bookman Old Style" panose="02050604050505020204" pitchFamily="18" charset="0"/>
                       </a:endParaRPr>
                     </a:p>
@@ -23943,7 +23992,7 @@
                 </a:tc>
                 <a:extLst>
                   <a:ext uri="{0D108BD9-81ED-4DB2-BD59-A6C34878D82A}">
-                    <a16:rowId xmlns:a16="http://schemas.microsoft.com/office/drawing/2014/main" xmlns="" val="10007"/>
+                    <a16:rowId xmlns="" xmlns:a16="http://schemas.microsoft.com/office/drawing/2014/main" val="10007"/>
                   </a:ext>
                 </a:extLst>
               </a:tr>
@@ -24049,12 +24098,18 @@
                     <a:p>
                       <a:pPr algn="ctr"/>
                       <a:r>
-                        <a:rPr lang="ru-RU" sz="1000" dirty="0" smtClean="0">
+                        <a:rPr lang="en-US" sz="1000" smtClean="0">
+                          <a:solidFill>
+                            <a:schemeClr val="tx1"/>
+                          </a:solidFill>
                           <a:latin typeface="Bookman Old Style" panose="02050604050505020204" pitchFamily="18" charset="0"/>
                         </a:rPr>
-                        <a:t>942</a:t>
+                        <a:t>930</a:t>
                       </a:r>
                       <a:endParaRPr lang="ru-RU" sz="1000" dirty="0">
+                        <a:solidFill>
+                          <a:schemeClr val="tx1"/>
+                        </a:solidFill>
                         <a:latin typeface="Bookman Old Style" panose="02050604050505020204" pitchFamily="18" charset="0"/>
                       </a:endParaRPr>
                     </a:p>
@@ -24101,7 +24156,7 @@
                 </a:tc>
                 <a:extLst>
                   <a:ext uri="{0D108BD9-81ED-4DB2-BD59-A6C34878D82A}">
-                    <a16:rowId xmlns:a16="http://schemas.microsoft.com/office/drawing/2014/main" xmlns="" val="10008"/>
+                    <a16:rowId xmlns="" xmlns:a16="http://schemas.microsoft.com/office/drawing/2014/main" val="10008"/>
                   </a:ext>
                 </a:extLst>
               </a:tr>
@@ -27317,7 +27372,7 @@
           <a:graphicData uri="http://schemas.openxmlformats.org/presentationml/2006/ole">
             <mc:AlternateContent xmlns:mc="http://schemas.openxmlformats.org/markup-compatibility/2006">
               <mc:Choice xmlns:v="urn:schemas-microsoft-com:vml" Requires="v">
-                <p:oleObj spid="_x0000_s50538" name="Формула" r:id="rId3" imgW="317160" imgH="164880" progId="Equation.3">
+                <p:oleObj spid="_x0000_s50618" name="Формула" r:id="rId3" imgW="317160" imgH="164880" progId="Equation.3">
                   <p:embed/>
                 </p:oleObj>
               </mc:Choice>
@@ -27387,7 +27442,7 @@
           <a:graphicData uri="http://schemas.openxmlformats.org/presentationml/2006/ole">
             <mc:AlternateContent xmlns:mc="http://schemas.openxmlformats.org/markup-compatibility/2006">
               <mc:Choice xmlns:v="urn:schemas-microsoft-com:vml" Requires="v">
-                <p:oleObj spid="_x0000_s50539" name="Формула" r:id="rId5" imgW="1307880" imgH="241200" progId="Equation.3">
+                <p:oleObj spid="_x0000_s50619" name="Формула" r:id="rId5" imgW="1307880" imgH="241200" progId="Equation.3">
                   <p:embed/>
                 </p:oleObj>
               </mc:Choice>
@@ -27457,7 +27512,7 @@
           <a:graphicData uri="http://schemas.openxmlformats.org/presentationml/2006/ole">
             <mc:AlternateContent xmlns:mc="http://schemas.openxmlformats.org/markup-compatibility/2006">
               <mc:Choice xmlns:v="urn:schemas-microsoft-com:vml" Requires="v">
-                <p:oleObj spid="_x0000_s50540" name="Формула" r:id="rId7" imgW="596880" imgH="431640" progId="Equation.3">
+                <p:oleObj spid="_x0000_s50620" name="Формула" r:id="rId7" imgW="596880" imgH="431640" progId="Equation.3">
                   <p:embed/>
                 </p:oleObj>
               </mc:Choice>
@@ -27527,7 +27582,7 @@
           <a:graphicData uri="http://schemas.openxmlformats.org/presentationml/2006/ole">
             <mc:AlternateContent xmlns:mc="http://schemas.openxmlformats.org/markup-compatibility/2006">
               <mc:Choice xmlns:v="urn:schemas-microsoft-com:vml" Requires="v">
-                <p:oleObj spid="_x0000_s50541" name="Формула" r:id="rId9" imgW="1028520" imgH="431640" progId="Equation.3">
+                <p:oleObj spid="_x0000_s50621" name="Формула" r:id="rId9" imgW="1028520" imgH="431640" progId="Equation.3">
                   <p:embed/>
                 </p:oleObj>
               </mc:Choice>
@@ -27597,7 +27652,7 @@
           <a:graphicData uri="http://schemas.openxmlformats.org/presentationml/2006/ole">
             <mc:AlternateContent xmlns:mc="http://schemas.openxmlformats.org/markup-compatibility/2006">
               <mc:Choice xmlns:v="urn:schemas-microsoft-com:vml" Requires="v">
-                <p:oleObj spid="_x0000_s50542" name="Формула" r:id="rId11" imgW="1282680" imgH="228600" progId="Equation.3">
+                <p:oleObj spid="_x0000_s50622" name="Формула" r:id="rId11" imgW="1282680" imgH="228600" progId="Equation.3">
                   <p:embed/>
                 </p:oleObj>
               </mc:Choice>
@@ -27667,7 +27722,7 @@
           <a:graphicData uri="http://schemas.openxmlformats.org/presentationml/2006/ole">
             <mc:AlternateContent xmlns:mc="http://schemas.openxmlformats.org/markup-compatibility/2006">
               <mc:Choice xmlns:v="urn:schemas-microsoft-com:vml" Requires="v">
-                <p:oleObj spid="_x0000_s50543" name="Формула" r:id="rId13" imgW="1130040" imgH="431640" progId="Equation.3">
+                <p:oleObj spid="_x0000_s50623" name="Формула" r:id="rId13" imgW="1130040" imgH="431640" progId="Equation.3">
                   <p:embed/>
                 </p:oleObj>
               </mc:Choice>
@@ -27737,7 +27792,7 @@
           <a:graphicData uri="http://schemas.openxmlformats.org/presentationml/2006/ole">
             <mc:AlternateContent xmlns:mc="http://schemas.openxmlformats.org/markup-compatibility/2006">
               <mc:Choice xmlns:v="urn:schemas-microsoft-com:vml" Requires="v">
-                <p:oleObj spid="_x0000_s50544" name="Формула" r:id="rId15" imgW="1447560" imgH="495000" progId="Equation.3">
+                <p:oleObj spid="_x0000_s50624" name="Формула" r:id="rId15" imgW="1447560" imgH="495000" progId="Equation.3">
                   <p:embed/>
                 </p:oleObj>
               </mc:Choice>
@@ -27807,7 +27862,7 @@
           <a:graphicData uri="http://schemas.openxmlformats.org/presentationml/2006/ole">
             <mc:AlternateContent xmlns:mc="http://schemas.openxmlformats.org/markup-compatibility/2006">
               <mc:Choice xmlns:v="urn:schemas-microsoft-com:vml" Requires="v">
-                <p:oleObj spid="_x0000_s50545" name="Формула" r:id="rId17" imgW="749160" imgH="241200" progId="Equation.3">
+                <p:oleObj spid="_x0000_s50625" name="Формула" r:id="rId17" imgW="749160" imgH="241200" progId="Equation.3">
                   <p:embed/>
                 </p:oleObj>
               </mc:Choice>
@@ -27877,7 +27932,7 @@
           <a:graphicData uri="http://schemas.openxmlformats.org/presentationml/2006/ole">
             <mc:AlternateContent xmlns:mc="http://schemas.openxmlformats.org/markup-compatibility/2006">
               <mc:Choice xmlns:v="urn:schemas-microsoft-com:vml" Requires="v">
-                <p:oleObj spid="_x0000_s50546" name="Формула" r:id="rId19" imgW="1206360" imgH="241200" progId="Equation.3">
+                <p:oleObj spid="_x0000_s50626" name="Формула" r:id="rId19" imgW="1206360" imgH="241200" progId="Equation.3">
                   <p:embed/>
                 </p:oleObj>
               </mc:Choice>
@@ -27947,7 +28002,7 @@
           <a:graphicData uri="http://schemas.openxmlformats.org/presentationml/2006/ole">
             <mc:AlternateContent xmlns:mc="http://schemas.openxmlformats.org/markup-compatibility/2006">
               <mc:Choice xmlns:v="urn:schemas-microsoft-com:vml" Requires="v">
-                <p:oleObj spid="_x0000_s50547" name="Формула" r:id="rId21" imgW="634680" imgH="393480" progId="Equation.3">
+                <p:oleObj spid="_x0000_s50627" name="Формула" r:id="rId21" imgW="634680" imgH="393480" progId="Equation.3">
                   <p:embed/>
                 </p:oleObj>
               </mc:Choice>
@@ -28017,7 +28072,7 @@
           <a:graphicData uri="http://schemas.openxmlformats.org/presentationml/2006/ole">
             <mc:AlternateContent xmlns:mc="http://schemas.openxmlformats.org/markup-compatibility/2006">
               <mc:Choice xmlns:v="urn:schemas-microsoft-com:vml" Requires="v">
-                <p:oleObj spid="_x0000_s50548" name="Уравнение" r:id="rId23" imgW="4356000" imgH="482400" progId="Equation.3">
+                <p:oleObj spid="_x0000_s50628" name="Уравнение" r:id="rId23" imgW="4356000" imgH="482400" progId="Equation.3">
                   <p:embed/>
                 </p:oleObj>
               </mc:Choice>
@@ -28087,7 +28142,7 @@
           <a:graphicData uri="http://schemas.openxmlformats.org/presentationml/2006/ole">
             <mc:AlternateContent xmlns:mc="http://schemas.openxmlformats.org/markup-compatibility/2006">
               <mc:Choice xmlns:v="urn:schemas-microsoft-com:vml" Requires="v">
-                <p:oleObj spid="_x0000_s50549" name="Формула" r:id="rId25" imgW="2946240" imgH="431640" progId="Equation.3">
+                <p:oleObj spid="_x0000_s50629" name="Формула" r:id="rId25" imgW="2946240" imgH="431640" progId="Equation.3">
                   <p:embed/>
                 </p:oleObj>
               </mc:Choice>
@@ -29242,7 +29297,7 @@
           <a:graphicData uri="http://schemas.openxmlformats.org/presentationml/2006/ole">
             <mc:AlternateContent xmlns:mc="http://schemas.openxmlformats.org/markup-compatibility/2006">
               <mc:Choice xmlns:v="urn:schemas-microsoft-com:vml" Requires="v">
-                <p:oleObj spid="_x0000_s50550" name="Picture" r:id="rId27" imgW="5861465" imgH="2543447" progId="Word.Picture.8">
+                <p:oleObj spid="_x0000_s50630" name="Picture" r:id="rId27" imgW="5861465" imgH="2543447" progId="Word.Picture.8">
                   <p:embed/>
                 </p:oleObj>
               </mc:Choice>
@@ -29474,7 +29529,7 @@
           <a:graphicData uri="http://schemas.openxmlformats.org/presentationml/2006/ole">
             <mc:AlternateContent xmlns:mc="http://schemas.openxmlformats.org/markup-compatibility/2006">
               <mc:Choice xmlns:v="urn:schemas-microsoft-com:vml" Requires="v">
-                <p:oleObj spid="_x0000_s50551" name="Уравнение" r:id="rId29" imgW="3593880" imgH="965160" progId="Equation.3">
+                <p:oleObj spid="_x0000_s50631" name="Уравнение" r:id="rId29" imgW="3593880" imgH="965160" progId="Equation.3">
                   <p:embed/>
                 </p:oleObj>
               </mc:Choice>
@@ -29544,7 +29599,7 @@
           <a:graphicData uri="http://schemas.openxmlformats.org/presentationml/2006/ole">
             <mc:AlternateContent xmlns:mc="http://schemas.openxmlformats.org/markup-compatibility/2006">
               <mc:Choice xmlns:v="urn:schemas-microsoft-com:vml" Requires="v">
-                <p:oleObj spid="_x0000_s50552" name="Уравнение" r:id="rId31" imgW="1739880" imgH="241200" progId="Equation.3">
+                <p:oleObj spid="_x0000_s50632" name="Уравнение" r:id="rId31" imgW="1739880" imgH="241200" progId="Equation.3">
                   <p:embed/>
                 </p:oleObj>
               </mc:Choice>
@@ -29614,7 +29669,7 @@
           <a:graphicData uri="http://schemas.openxmlformats.org/presentationml/2006/ole">
             <mc:AlternateContent xmlns:mc="http://schemas.openxmlformats.org/markup-compatibility/2006">
               <mc:Choice xmlns:v="urn:schemas-microsoft-com:vml" Requires="v">
-                <p:oleObj spid="_x0000_s50553" name="Уравнение" r:id="rId33" imgW="1130040" imgH="393480" progId="Equation.3">
+                <p:oleObj spid="_x0000_s50633" name="Уравнение" r:id="rId33" imgW="1130040" imgH="393480" progId="Equation.3">
                   <p:embed/>
                 </p:oleObj>
               </mc:Choice>
@@ -31526,7 +31581,7 @@
           <a:graphicData uri="http://schemas.openxmlformats.org/presentationml/2006/ole">
             <mc:AlternateContent xmlns:mc="http://schemas.openxmlformats.org/markup-compatibility/2006">
               <mc:Choice xmlns:v="urn:schemas-microsoft-com:vml" Requires="v">
-                <p:oleObj spid="_x0000_s51460" name="Формула" r:id="rId3" imgW="545760" imgH="241200" progId="Equation.3">
+                <p:oleObj spid="_x0000_s51510" name="Формула" r:id="rId3" imgW="545760" imgH="241200" progId="Equation.3">
                   <p:embed/>
                 </p:oleObj>
               </mc:Choice>
@@ -31821,7 +31876,7 @@
           <a:graphicData uri="http://schemas.openxmlformats.org/presentationml/2006/ole">
             <mc:AlternateContent xmlns:mc="http://schemas.openxmlformats.org/markup-compatibility/2006">
               <mc:Choice xmlns:v="urn:schemas-microsoft-com:vml" Requires="v">
-                <p:oleObj spid="_x0000_s51461" name="Формула" r:id="rId5" imgW="1485720" imgH="609480" progId="Equation.3">
+                <p:oleObj spid="_x0000_s51511" name="Формула" r:id="rId5" imgW="1485720" imgH="609480" progId="Equation.3">
                   <p:embed/>
                 </p:oleObj>
               </mc:Choice>
@@ -31891,7 +31946,7 @@
           <a:graphicData uri="http://schemas.openxmlformats.org/presentationml/2006/ole">
             <mc:AlternateContent xmlns:mc="http://schemas.openxmlformats.org/markup-compatibility/2006">
               <mc:Choice xmlns:v="urn:schemas-microsoft-com:vml" Requires="v">
-                <p:oleObj spid="_x0000_s51462" name="Документ" r:id="rId7" imgW="5046662" imgH="2540557" progId="Word.Document.12">
+                <p:oleObj spid="_x0000_s51512" name="Документ" r:id="rId7" imgW="5046662" imgH="2540557" progId="Word.Document.12">
                   <p:embed/>
                 </p:oleObj>
               </mc:Choice>
@@ -32015,7 +32070,7 @@
           <a:graphicData uri="http://schemas.openxmlformats.org/presentationml/2006/ole">
             <mc:AlternateContent xmlns:mc="http://schemas.openxmlformats.org/markup-compatibility/2006">
               <mc:Choice xmlns:v="urn:schemas-microsoft-com:vml" Requires="v">
-                <p:oleObj spid="_x0000_s51463" name="Формула" r:id="rId9" imgW="1307880" imgH="482400" progId="Equation.3">
+                <p:oleObj spid="_x0000_s51513" name="Формула" r:id="rId9" imgW="1307880" imgH="482400" progId="Equation.3">
                   <p:embed/>
                 </p:oleObj>
               </mc:Choice>
@@ -32189,7 +32244,7 @@
           <a:graphicData uri="http://schemas.openxmlformats.org/presentationml/2006/ole">
             <mc:AlternateContent xmlns:mc="http://schemas.openxmlformats.org/markup-compatibility/2006">
               <mc:Choice xmlns:v="urn:schemas-microsoft-com:vml" Requires="v">
-                <p:oleObj spid="_x0000_s51464" name="Формула" r:id="rId11" imgW="1726920" imgH="266400" progId="Equation.3">
+                <p:oleObj spid="_x0000_s51514" name="Формула" r:id="rId11" imgW="1726920" imgH="266400" progId="Equation.3">
                   <p:embed/>
                 </p:oleObj>
               </mc:Choice>
@@ -32259,7 +32314,7 @@
           <a:graphicData uri="http://schemas.openxmlformats.org/presentationml/2006/ole">
             <mc:AlternateContent xmlns:mc="http://schemas.openxmlformats.org/markup-compatibility/2006">
               <mc:Choice xmlns:v="urn:schemas-microsoft-com:vml" Requires="v">
-                <p:oleObj spid="_x0000_s51465" name="Формула" r:id="rId13" imgW="2044440" imgH="520560" progId="Equation.3">
+                <p:oleObj spid="_x0000_s51515" name="Формула" r:id="rId13" imgW="2044440" imgH="520560" progId="Equation.3">
                   <p:embed/>
                 </p:oleObj>
               </mc:Choice>
@@ -32329,7 +32384,7 @@
           <a:graphicData uri="http://schemas.openxmlformats.org/presentationml/2006/ole">
             <mc:AlternateContent xmlns:mc="http://schemas.openxmlformats.org/markup-compatibility/2006">
               <mc:Choice xmlns:v="urn:schemas-microsoft-com:vml" Requires="v">
-                <p:oleObj spid="_x0000_s51466" name="Формула" r:id="rId15" imgW="1041120" imgH="444240" progId="Equation.3">
+                <p:oleObj spid="_x0000_s51516" name="Формула" r:id="rId15" imgW="1041120" imgH="444240" progId="Equation.3">
                   <p:embed/>
                 </p:oleObj>
               </mc:Choice>
@@ -32399,7 +32454,7 @@
           <a:graphicData uri="http://schemas.openxmlformats.org/presentationml/2006/ole">
             <mc:AlternateContent xmlns:mc="http://schemas.openxmlformats.org/markup-compatibility/2006">
               <mc:Choice xmlns:v="urn:schemas-microsoft-com:vml" Requires="v">
-                <p:oleObj spid="_x0000_s51467" name="Формула" r:id="rId17" imgW="2501640" imgH="533160" progId="Equation.3">
+                <p:oleObj spid="_x0000_s51517" name="Формула" r:id="rId17" imgW="2501640" imgH="533160" progId="Equation.3">
                   <p:embed/>
                 </p:oleObj>
               </mc:Choice>
@@ -33320,7 +33375,7 @@
           <a:graphicData uri="http://schemas.openxmlformats.org/presentationml/2006/ole">
             <mc:AlternateContent xmlns:mc="http://schemas.openxmlformats.org/markup-compatibility/2006">
               <mc:Choice xmlns:v="urn:schemas-microsoft-com:vml" Requires="v">
-                <p:oleObj spid="_x0000_s51468" name="Формула" r:id="rId19" imgW="698400" imgH="241200" progId="Equation.3">
+                <p:oleObj spid="_x0000_s51518" name="Формула" r:id="rId19" imgW="698400" imgH="241200" progId="Equation.3">
                   <p:embed/>
                 </p:oleObj>
               </mc:Choice>
@@ -33390,7 +33445,7 @@
           <a:graphicData uri="http://schemas.openxmlformats.org/presentationml/2006/ole">
             <mc:AlternateContent xmlns:mc="http://schemas.openxmlformats.org/markup-compatibility/2006">
               <mc:Choice xmlns:v="urn:schemas-microsoft-com:vml" Requires="v">
-                <p:oleObj spid="_x0000_s51469" name="Формула" r:id="rId21" imgW="825480" imgH="330120" progId="Equation.3">
+                <p:oleObj spid="_x0000_s51519" name="Формула" r:id="rId21" imgW="825480" imgH="330120" progId="Equation.3">
                   <p:embed/>
                 </p:oleObj>
               </mc:Choice>
@@ -34486,7 +34541,7 @@
           <a:graphicData uri="http://schemas.openxmlformats.org/presentationml/2006/ole">
             <mc:AlternateContent xmlns:mc="http://schemas.openxmlformats.org/markup-compatibility/2006">
               <mc:Choice xmlns:v="urn:schemas-microsoft-com:vml" Requires="v">
-                <p:oleObj spid="_x0000_s45769" name="Формула" r:id="rId3" imgW="1409400" imgH="215640" progId="Equation.3">
+                <p:oleObj spid="_x0000_s45779" name="Формула" r:id="rId3" imgW="1409400" imgH="215640" progId="Equation.3">
                   <p:embed/>
                 </p:oleObj>
               </mc:Choice>
@@ -34543,7 +34598,7 @@
           <a:graphicData uri="http://schemas.openxmlformats.org/presentationml/2006/ole">
             <mc:AlternateContent xmlns:mc="http://schemas.openxmlformats.org/markup-compatibility/2006">
               <mc:Choice xmlns:v="urn:schemas-microsoft-com:vml" Requires="v">
-                <p:oleObj spid="_x0000_s45770" name="Уравнение" r:id="rId5" imgW="1079280" imgH="241200" progId="Equation.3">
+                <p:oleObj spid="_x0000_s45780" name="Уравнение" r:id="rId5" imgW="1079280" imgH="241200" progId="Equation.3">
                   <p:embed/>
                 </p:oleObj>
               </mc:Choice>
@@ -35067,14 +35122,14 @@
                     <a:gridCol w="2307912">
                       <a:extLst>
                         <a:ext uri="{9D8B030D-6E8A-4147-A177-3AD203B41FA5}">
-                          <a16:colId xmlns:a16="http://schemas.microsoft.com/office/drawing/2014/main" xmlns="" val="20000"/>
+                          <a16:colId xmlns="" xmlns:a16="http://schemas.microsoft.com/office/drawing/2014/main" val="20000"/>
                         </a:ext>
                       </a:extLst>
                     </a:gridCol>
                     <a:gridCol w="1391700">
                       <a:extLst>
                         <a:ext uri="{9D8B030D-6E8A-4147-A177-3AD203B41FA5}">
-                          <a16:colId xmlns:a16="http://schemas.microsoft.com/office/drawing/2014/main" xmlns="" val="20001"/>
+                          <a16:colId xmlns="" xmlns:a16="http://schemas.microsoft.com/office/drawing/2014/main" val="20001"/>
                         </a:ext>
                       </a:extLst>
                     </a:gridCol>
@@ -35124,7 +35179,7 @@
                     </a:tc>
                     <a:extLst>
                       <a:ext uri="{0D108BD9-81ED-4DB2-BD59-A6C34878D82A}">
-                        <a16:rowId xmlns:a16="http://schemas.microsoft.com/office/drawing/2014/main" xmlns="" val="10000"/>
+                        <a16:rowId xmlns="" xmlns:a16="http://schemas.microsoft.com/office/drawing/2014/main" val="10000"/>
                       </a:ext>
                     </a:extLst>
                   </a:tr>
@@ -35199,7 +35254,7 @@
                     </a:tc>
                     <a:extLst>
                       <a:ext uri="{0D108BD9-81ED-4DB2-BD59-A6C34878D82A}">
-                        <a16:rowId xmlns:a16="http://schemas.microsoft.com/office/drawing/2014/main" xmlns="" val="10001"/>
+                        <a16:rowId xmlns="" xmlns:a16="http://schemas.microsoft.com/office/drawing/2014/main" val="10001"/>
                       </a:ext>
                     </a:extLst>
                   </a:tr>
@@ -35284,7 +35339,7 @@
                     </a:tc>
                     <a:extLst>
                       <a:ext uri="{0D108BD9-81ED-4DB2-BD59-A6C34878D82A}">
-                        <a16:rowId xmlns:a16="http://schemas.microsoft.com/office/drawing/2014/main" xmlns="" val="10002"/>
+                        <a16:rowId xmlns="" xmlns:a16="http://schemas.microsoft.com/office/drawing/2014/main" val="10002"/>
                       </a:ext>
                     </a:extLst>
                   </a:tr>
@@ -35385,7 +35440,7 @@
                     </a:tc>
                     <a:extLst>
                       <a:ext uri="{0D108BD9-81ED-4DB2-BD59-A6C34878D82A}">
-                        <a16:rowId xmlns:a16="http://schemas.microsoft.com/office/drawing/2014/main" xmlns="" val="10003"/>
+                        <a16:rowId xmlns="" xmlns:a16="http://schemas.microsoft.com/office/drawing/2014/main" val="10003"/>
                       </a:ext>
                     </a:extLst>
                   </a:tr>
@@ -35443,7 +35498,7 @@
                     </a:tc>
                     <a:extLst>
                       <a:ext uri="{0D108BD9-81ED-4DB2-BD59-A6C34878D82A}">
-                        <a16:rowId xmlns:a16="http://schemas.microsoft.com/office/drawing/2014/main" xmlns="" val="10004"/>
+                        <a16:rowId xmlns="" xmlns:a16="http://schemas.microsoft.com/office/drawing/2014/main" val="10004"/>
                       </a:ext>
                     </a:extLst>
                   </a:tr>
@@ -35557,7 +35612,7 @@
                     </a:tc>
                     <a:extLst>
                       <a:ext uri="{0D108BD9-81ED-4DB2-BD59-A6C34878D82A}">
-                        <a16:rowId xmlns:a16="http://schemas.microsoft.com/office/drawing/2014/main" xmlns="" val="10005"/>
+                        <a16:rowId xmlns="" xmlns:a16="http://schemas.microsoft.com/office/drawing/2014/main" val="10005"/>
                       </a:ext>
                     </a:extLst>
                   </a:tr>
@@ -35613,7 +35668,7 @@
                     </a:tc>
                     <a:extLst>
                       <a:ext uri="{0D108BD9-81ED-4DB2-BD59-A6C34878D82A}">
-                        <a16:rowId xmlns:a16="http://schemas.microsoft.com/office/drawing/2014/main" xmlns="" val="10006"/>
+                        <a16:rowId xmlns="" xmlns:a16="http://schemas.microsoft.com/office/drawing/2014/main" val="10006"/>
                       </a:ext>
                     </a:extLst>
                   </a:tr>
@@ -36696,7 +36751,7 @@
           <a:graphicData uri="http://schemas.openxmlformats.org/presentationml/2006/ole">
             <mc:AlternateContent xmlns:mc="http://schemas.openxmlformats.org/markup-compatibility/2006">
               <mc:Choice xmlns:v="urn:schemas-microsoft-com:vml" Requires="v">
-                <p:oleObj spid="_x0000_s49062" name="Формула" r:id="rId3" imgW="2095200" imgH="228600" progId="Equation.3">
+                <p:oleObj spid="_x0000_s53248" name="Формула" r:id="rId3" imgW="2095200" imgH="228600" progId="Equation.3">
                   <p:embed/>
                 </p:oleObj>
               </mc:Choice>
@@ -36766,7 +36821,7 @@
           <a:graphicData uri="http://schemas.openxmlformats.org/presentationml/2006/ole">
             <mc:AlternateContent xmlns:mc="http://schemas.openxmlformats.org/markup-compatibility/2006">
               <mc:Choice xmlns:v="urn:schemas-microsoft-com:vml" Requires="v">
-                <p:oleObj spid="_x0000_s49063" name="Формула" r:id="rId5" imgW="736560" imgH="228600" progId="Equation.3">
+                <p:oleObj spid="_x0000_s53249" name="Формула" r:id="rId5" imgW="736560" imgH="228600" progId="Equation.3">
                   <p:embed/>
                 </p:oleObj>
               </mc:Choice>
@@ -37273,7 +37328,7 @@
           <a:graphicData uri="http://schemas.openxmlformats.org/presentationml/2006/ole">
             <mc:AlternateContent xmlns:mc="http://schemas.openxmlformats.org/markup-compatibility/2006">
               <mc:Choice xmlns:v="urn:schemas-microsoft-com:vml" Requires="v">
-                <p:oleObj spid="_x0000_s49064" name="Формула" r:id="rId7" imgW="1143000" imgH="228600" progId="Equation.3">
+                <p:oleObj spid="_x0000_s53250" name="Формула" r:id="rId7" imgW="1143000" imgH="228600" progId="Equation.3">
                   <p:embed/>
                 </p:oleObj>
               </mc:Choice>
@@ -37343,7 +37398,7 @@
           <a:graphicData uri="http://schemas.openxmlformats.org/presentationml/2006/ole">
             <mc:AlternateContent xmlns:mc="http://schemas.openxmlformats.org/markup-compatibility/2006">
               <mc:Choice xmlns:v="urn:schemas-microsoft-com:vml" Requires="v">
-                <p:oleObj spid="_x0000_s49065" name="Формула" r:id="rId9" imgW="812520" imgH="228600" progId="Equation.3">
+                <p:oleObj spid="_x0000_s53251" name="Формула" r:id="rId9" imgW="812520" imgH="228600" progId="Equation.3">
                   <p:embed/>
                 </p:oleObj>
               </mc:Choice>
@@ -37413,7 +37468,7 @@
           <a:graphicData uri="http://schemas.openxmlformats.org/presentationml/2006/ole">
             <mc:AlternateContent xmlns:mc="http://schemas.openxmlformats.org/markup-compatibility/2006">
               <mc:Choice xmlns:v="urn:schemas-microsoft-com:vml" Requires="v">
-                <p:oleObj spid="_x0000_s49066" name="Формула" r:id="rId11" imgW="253800" imgH="228600" progId="Equation.3">
+                <p:oleObj spid="_x0000_s53252" name="Формула" r:id="rId11" imgW="253800" imgH="228600" progId="Equation.3">
                   <p:embed/>
                 </p:oleObj>
               </mc:Choice>
@@ -37536,7 +37591,7 @@
           <a:graphicData uri="http://schemas.openxmlformats.org/presentationml/2006/ole">
             <mc:AlternateContent xmlns:mc="http://schemas.openxmlformats.org/markup-compatibility/2006">
               <mc:Choice xmlns:v="urn:schemas-microsoft-com:vml" Requires="v">
-                <p:oleObj spid="_x0000_s49067" name="Формула" r:id="rId13" imgW="241200" imgH="228600" progId="Equation.3">
+                <p:oleObj spid="_x0000_s53253" name="Формула" r:id="rId13" imgW="241200" imgH="228600" progId="Equation.3">
                   <p:embed/>
                 </p:oleObj>
               </mc:Choice>
@@ -37606,7 +37661,7 @@
           <a:graphicData uri="http://schemas.openxmlformats.org/presentationml/2006/ole">
             <mc:AlternateContent xmlns:mc="http://schemas.openxmlformats.org/markup-compatibility/2006">
               <mc:Choice xmlns:v="urn:schemas-microsoft-com:vml" Requires="v">
-                <p:oleObj spid="_x0000_s49068" name="Формула" r:id="rId15" imgW="1447560" imgH="482400" progId="Equation.3">
+                <p:oleObj spid="_x0000_s53254" name="Формула" r:id="rId15" imgW="1447560" imgH="482400" progId="Equation.3">
                   <p:embed/>
                 </p:oleObj>
               </mc:Choice>
@@ -37832,7 +37887,7 @@
           <a:graphicData uri="http://schemas.openxmlformats.org/presentationml/2006/ole">
             <mc:AlternateContent xmlns:mc="http://schemas.openxmlformats.org/markup-compatibility/2006">
               <mc:Choice xmlns:v="urn:schemas-microsoft-com:vml" Requires="v">
-                <p:oleObj spid="_x0000_s49069" name="Уравнение" r:id="rId17" imgW="1422360" imgH="241200" progId="Equation.3">
+                <p:oleObj spid="_x0000_s53255" name="Уравнение" r:id="rId17" imgW="1422360" imgH="241200" progId="Equation.3">
                   <p:embed/>
                 </p:oleObj>
               </mc:Choice>
@@ -37902,7 +37957,7 @@
           <a:graphicData uri="http://schemas.openxmlformats.org/presentationml/2006/ole">
             <mc:AlternateContent xmlns:mc="http://schemas.openxmlformats.org/markup-compatibility/2006">
               <mc:Choice xmlns:v="urn:schemas-microsoft-com:vml" Requires="v">
-                <p:oleObj spid="_x0000_s49070" name="Формула" r:id="rId19" imgW="1168200" imgH="266400" progId="Equation.3">
+                <p:oleObj spid="_x0000_s53256" name="Формула" r:id="rId19" imgW="1168200" imgH="266400" progId="Equation.3">
                   <p:embed/>
                 </p:oleObj>
               </mc:Choice>
@@ -37972,7 +38027,7 @@
           <a:graphicData uri="http://schemas.openxmlformats.org/presentationml/2006/ole">
             <mc:AlternateContent xmlns:mc="http://schemas.openxmlformats.org/markup-compatibility/2006">
               <mc:Choice xmlns:v="urn:schemas-microsoft-com:vml" Requires="v">
-                <p:oleObj spid="_x0000_s49071" name="Уравнение" r:id="rId21" imgW="330120" imgH="241200" progId="Equation.3">
+                <p:oleObj spid="_x0000_s53257" name="Уравнение" r:id="rId21" imgW="330120" imgH="241200" progId="Equation.3">
                   <p:embed/>
                 </p:oleObj>
               </mc:Choice>
@@ -38042,7 +38097,7 @@
           <a:graphicData uri="http://schemas.openxmlformats.org/presentationml/2006/ole">
             <mc:AlternateContent xmlns:mc="http://schemas.openxmlformats.org/markup-compatibility/2006">
               <mc:Choice xmlns:v="urn:schemas-microsoft-com:vml" Requires="v">
-                <p:oleObj spid="_x0000_s49072" name="Формула" r:id="rId23" imgW="850680" imgH="241200" progId="Equation.3">
+                <p:oleObj spid="_x0000_s53258" name="Формула" r:id="rId23" imgW="850680" imgH="241200" progId="Equation.3">
                   <p:embed/>
                 </p:oleObj>
               </mc:Choice>
@@ -38260,7 +38315,7 @@
           <a:graphicData uri="http://schemas.openxmlformats.org/presentationml/2006/ole">
             <mc:AlternateContent xmlns:mc="http://schemas.openxmlformats.org/markup-compatibility/2006">
               <mc:Choice xmlns:v="urn:schemas-microsoft-com:vml" Requires="v">
-                <p:oleObj spid="_x0000_s49073" name="Формула" r:id="rId25" imgW="3454200" imgH="253800" progId="Equation.3">
+                <p:oleObj spid="_x0000_s53259" name="Формула" r:id="rId25" imgW="3454200" imgH="253800" progId="Equation.3">
                   <p:embed/>
                 </p:oleObj>
               </mc:Choice>
@@ -38533,7 +38588,7 @@
           <a:graphicData uri="http://schemas.openxmlformats.org/presentationml/2006/ole">
             <mc:AlternateContent xmlns:mc="http://schemas.openxmlformats.org/markup-compatibility/2006">
               <mc:Choice xmlns:v="urn:schemas-microsoft-com:vml" Requires="v">
-                <p:oleObj spid="_x0000_s49074" name="Уравнение" r:id="rId28" imgW="1307880" imgH="431640" progId="Equation.3">
+                <p:oleObj spid="_x0000_s53260" name="Уравнение" r:id="rId28" imgW="1307880" imgH="431640" progId="Equation.3">
                   <p:embed/>
                 </p:oleObj>
               </mc:Choice>
@@ -38651,7 +38706,7 @@
           <a:graphicData uri="http://schemas.openxmlformats.org/presentationml/2006/ole">
             <mc:AlternateContent xmlns:mc="http://schemas.openxmlformats.org/markup-compatibility/2006">
               <mc:Choice xmlns:v="urn:schemas-microsoft-com:vml" Requires="v">
-                <p:oleObj spid="_x0000_s49075" name="Формула" r:id="rId30" imgW="1955520" imgH="393480" progId="Equation.3">
+                <p:oleObj spid="_x0000_s53261" name="Формула" r:id="rId30" imgW="1955520" imgH="393480" progId="Equation.3">
                   <p:embed/>
                 </p:oleObj>
               </mc:Choice>
@@ -38721,7 +38776,7 @@
           <a:graphicData uri="http://schemas.openxmlformats.org/presentationml/2006/ole">
             <mc:AlternateContent xmlns:mc="http://schemas.openxmlformats.org/markup-compatibility/2006">
               <mc:Choice xmlns:v="urn:schemas-microsoft-com:vml" Requires="v">
-                <p:oleObj spid="_x0000_s49076" name="Формула" r:id="rId32" imgW="2844720" imgH="393480" progId="Equation.3">
+                <p:oleObj spid="_x0000_s53262" name="Формула" r:id="rId32" imgW="2844720" imgH="393480" progId="Equation.3">
                   <p:embed/>
                 </p:oleObj>
               </mc:Choice>
@@ -38791,7 +38846,7 @@
           <a:graphicData uri="http://schemas.openxmlformats.org/presentationml/2006/ole">
             <mc:AlternateContent xmlns:mc="http://schemas.openxmlformats.org/markup-compatibility/2006">
               <mc:Choice xmlns:v="urn:schemas-microsoft-com:vml" Requires="v">
-                <p:oleObj spid="_x0000_s49077" name="Уравнение" r:id="rId34" imgW="1460160" imgH="393480" progId="Equation.3">
+                <p:oleObj spid="_x0000_s53263" name="Уравнение" r:id="rId34" imgW="1460160" imgH="393480" progId="Equation.3">
                   <p:embed/>
                 </p:oleObj>
               </mc:Choice>
@@ -38861,7 +38916,7 @@
           <a:graphicData uri="http://schemas.openxmlformats.org/presentationml/2006/ole">
             <mc:AlternateContent xmlns:mc="http://schemas.openxmlformats.org/markup-compatibility/2006">
               <mc:Choice xmlns:v="urn:schemas-microsoft-com:vml" Requires="v">
-                <p:oleObj spid="_x0000_s49078" name="Формула" r:id="rId36" imgW="1346040" imgH="393480" progId="Equation.3">
+                <p:oleObj spid="_x0000_s53264" name="Формула" r:id="rId36" imgW="1346040" imgH="393480" progId="Equation.3">
                   <p:embed/>
                 </p:oleObj>
               </mc:Choice>
@@ -38931,7 +38986,7 @@
           <a:graphicData uri="http://schemas.openxmlformats.org/presentationml/2006/ole">
             <mc:AlternateContent xmlns:mc="http://schemas.openxmlformats.org/markup-compatibility/2006">
               <mc:Choice xmlns:v="urn:schemas-microsoft-com:vml" Requires="v">
-                <p:oleObj spid="_x0000_s49079" name="Формула" r:id="rId38" imgW="647640" imgH="228600" progId="Equation.3">
+                <p:oleObj spid="_x0000_s53265" name="Формула" r:id="rId38" imgW="647640" imgH="228600" progId="Equation.3">
                   <p:embed/>
                 </p:oleObj>
               </mc:Choice>
@@ -39871,7 +39926,7 @@
           <a:graphicData uri="http://schemas.openxmlformats.org/presentationml/2006/ole">
             <mc:AlternateContent xmlns:mc="http://schemas.openxmlformats.org/markup-compatibility/2006">
               <mc:Choice xmlns:v="urn:schemas-microsoft-com:vml" Requires="v">
-                <p:oleObj spid="_x0000_s49672" name="Формула" r:id="rId3" imgW="1422360" imgH="393480" progId="Equation.3">
+                <p:oleObj spid="_x0000_s49747" name="Формула" r:id="rId3" imgW="1422360" imgH="393480" progId="Equation.3">
                   <p:embed/>
                 </p:oleObj>
               </mc:Choice>
@@ -39941,7 +39996,7 @@
           <a:graphicData uri="http://schemas.openxmlformats.org/presentationml/2006/ole">
             <mc:AlternateContent xmlns:mc="http://schemas.openxmlformats.org/markup-compatibility/2006">
               <mc:Choice xmlns:v="urn:schemas-microsoft-com:vml" Requires="v">
-                <p:oleObj spid="_x0000_s49673" name="Формула" r:id="rId5" imgW="1015920" imgH="393480" progId="Equation.3">
+                <p:oleObj spid="_x0000_s49748" name="Формула" r:id="rId5" imgW="1015920" imgH="393480" progId="Equation.3">
                   <p:embed/>
                 </p:oleObj>
               </mc:Choice>
@@ -40011,7 +40066,7 @@
           <a:graphicData uri="http://schemas.openxmlformats.org/presentationml/2006/ole">
             <mc:AlternateContent xmlns:mc="http://schemas.openxmlformats.org/markup-compatibility/2006">
               <mc:Choice xmlns:v="urn:schemas-microsoft-com:vml" Requires="v">
-                <p:oleObj spid="_x0000_s49674" name="Формула" r:id="rId7" imgW="1384200" imgH="393480" progId="Equation.3">
+                <p:oleObj spid="_x0000_s49749" name="Формула" r:id="rId7" imgW="1384200" imgH="393480" progId="Equation.3">
                   <p:embed/>
                 </p:oleObj>
               </mc:Choice>
@@ -40144,7 +40199,7 @@
           <a:graphicData uri="http://schemas.openxmlformats.org/presentationml/2006/ole">
             <mc:AlternateContent xmlns:mc="http://schemas.openxmlformats.org/markup-compatibility/2006">
               <mc:Choice xmlns:v="urn:schemas-microsoft-com:vml" Requires="v">
-                <p:oleObj spid="_x0000_s49675" name="Формула" r:id="rId9" imgW="1866600" imgH="469800" progId="Equation.3">
+                <p:oleObj spid="_x0000_s49750" name="Формула" r:id="rId9" imgW="1866600" imgH="469800" progId="Equation.3">
                   <p:embed/>
                 </p:oleObj>
               </mc:Choice>
@@ -40269,7 +40324,7 @@
           <a:graphicData uri="http://schemas.openxmlformats.org/presentationml/2006/ole">
             <mc:AlternateContent xmlns:mc="http://schemas.openxmlformats.org/markup-compatibility/2006">
               <mc:Choice xmlns:v="urn:schemas-microsoft-com:vml" Requires="v">
-                <p:oleObj spid="_x0000_s49676" name="Формула" r:id="rId11" imgW="1574640" imgH="457200" progId="Equation.3">
+                <p:oleObj spid="_x0000_s49751" name="Формула" r:id="rId11" imgW="1574640" imgH="457200" progId="Equation.3">
                   <p:embed/>
                 </p:oleObj>
               </mc:Choice>
@@ -40402,7 +40457,7 @@
           <a:graphicData uri="http://schemas.openxmlformats.org/presentationml/2006/ole">
             <mc:AlternateContent xmlns:mc="http://schemas.openxmlformats.org/markup-compatibility/2006">
               <mc:Choice xmlns:v="urn:schemas-microsoft-com:vml" Requires="v">
-                <p:oleObj spid="_x0000_s49677" name="Формула" r:id="rId13" imgW="1282680" imgH="495000" progId="Equation.3">
+                <p:oleObj spid="_x0000_s49752" name="Формула" r:id="rId13" imgW="1282680" imgH="495000" progId="Equation.3">
                   <p:embed/>
                 </p:oleObj>
               </mc:Choice>
@@ -40472,7 +40527,7 @@
           <a:graphicData uri="http://schemas.openxmlformats.org/presentationml/2006/ole">
             <mc:AlternateContent xmlns:mc="http://schemas.openxmlformats.org/markup-compatibility/2006">
               <mc:Choice xmlns:v="urn:schemas-microsoft-com:vml" Requires="v">
-                <p:oleObj spid="_x0000_s49678" name="Формула" r:id="rId15" imgW="1485720" imgH="457200" progId="Equation.3">
+                <p:oleObj spid="_x0000_s49753" name="Формула" r:id="rId15" imgW="1485720" imgH="457200" progId="Equation.3">
                   <p:embed/>
                 </p:oleObj>
               </mc:Choice>
@@ -41422,7 +41477,7 @@
           <a:graphicData uri="http://schemas.openxmlformats.org/presentationml/2006/ole">
             <mc:AlternateContent xmlns:mc="http://schemas.openxmlformats.org/markup-compatibility/2006">
               <mc:Choice xmlns:v="urn:schemas-microsoft-com:vml" Requires="v">
-                <p:oleObj spid="_x0000_s49679" name="Формула" r:id="rId17" imgW="863280" imgH="266400" progId="Equation.3">
+                <p:oleObj spid="_x0000_s49754" name="Формула" r:id="rId17" imgW="863280" imgH="266400" progId="Equation.3">
                   <p:embed/>
                 </p:oleObj>
               </mc:Choice>
@@ -41698,7 +41753,7 @@
           <a:graphicData uri="http://schemas.openxmlformats.org/presentationml/2006/ole">
             <mc:AlternateContent xmlns:mc="http://schemas.openxmlformats.org/markup-compatibility/2006">
               <mc:Choice xmlns:v="urn:schemas-microsoft-com:vml" Requires="v">
-                <p:oleObj spid="_x0000_s49680" name="Документ" r:id="rId19" imgW="4500076" imgH="2437089" progId="Word.Document.12">
+                <p:oleObj spid="_x0000_s49755" name="Документ" r:id="rId19" imgW="4500076" imgH="2437089" progId="Word.Document.12">
                   <p:embed/>
                 </p:oleObj>
               </mc:Choice>
@@ -41814,7 +41869,7 @@
           <a:graphicData uri="http://schemas.openxmlformats.org/presentationml/2006/ole">
             <mc:AlternateContent xmlns:mc="http://schemas.openxmlformats.org/markup-compatibility/2006">
               <mc:Choice xmlns:v="urn:schemas-microsoft-com:vml" Requires="v">
-                <p:oleObj spid="_x0000_s49681" name="Уравнение" r:id="rId21" imgW="1879560" imgH="228600" progId="Equation.3">
+                <p:oleObj spid="_x0000_s49756" name="Уравнение" r:id="rId21" imgW="1879560" imgH="228600" progId="Equation.3">
                   <p:embed/>
                 </p:oleObj>
               </mc:Choice>
@@ -41884,7 +41939,7 @@
           <a:graphicData uri="http://schemas.openxmlformats.org/presentationml/2006/ole">
             <mc:AlternateContent xmlns:mc="http://schemas.openxmlformats.org/markup-compatibility/2006">
               <mc:Choice xmlns:v="urn:schemas-microsoft-com:vml" Requires="v">
-                <p:oleObj spid="_x0000_s49682" name="Формула" r:id="rId23" imgW="2019240" imgH="228600" progId="Equation.3">
+                <p:oleObj spid="_x0000_s49757" name="Формула" r:id="rId23" imgW="2019240" imgH="228600" progId="Equation.3">
                   <p:embed/>
                 </p:oleObj>
               </mc:Choice>
@@ -41954,7 +42009,7 @@
           <a:graphicData uri="http://schemas.openxmlformats.org/presentationml/2006/ole">
             <mc:AlternateContent xmlns:mc="http://schemas.openxmlformats.org/markup-compatibility/2006">
               <mc:Choice xmlns:v="urn:schemas-microsoft-com:vml" Requires="v">
-                <p:oleObj spid="_x0000_s49683" name="Формула" r:id="rId25" imgW="812520" imgH="393480" progId="Equation.3">
+                <p:oleObj spid="_x0000_s49758" name="Формула" r:id="rId25" imgW="812520" imgH="393480" progId="Equation.3">
                   <p:embed/>
                 </p:oleObj>
               </mc:Choice>
@@ -42173,7 +42228,7 @@
           <a:graphicData uri="http://schemas.openxmlformats.org/presentationml/2006/ole">
             <mc:AlternateContent xmlns:mc="http://schemas.openxmlformats.org/markup-compatibility/2006">
               <mc:Choice xmlns:v="urn:schemas-microsoft-com:vml" Requires="v">
-                <p:oleObj spid="_x0000_s49684" name="Уравнение" r:id="rId27" imgW="685800" imgH="431640" progId="Equation.3">
+                <p:oleObj spid="_x0000_s49759" name="Уравнение" r:id="rId27" imgW="685800" imgH="431640" progId="Equation.3">
                   <p:embed/>
                 </p:oleObj>
               </mc:Choice>
@@ -42378,7 +42433,7 @@
           <a:graphicData uri="http://schemas.openxmlformats.org/presentationml/2006/ole">
             <mc:AlternateContent xmlns:mc="http://schemas.openxmlformats.org/markup-compatibility/2006">
               <mc:Choice xmlns:v="urn:schemas-microsoft-com:vml" Requires="v">
-                <p:oleObj spid="_x0000_s49685" name="Уравнение" r:id="rId29" imgW="164880" imgH="228600" progId="Equation.3">
+                <p:oleObj spid="_x0000_s49760" name="Уравнение" r:id="rId29" imgW="164880" imgH="228600" progId="Equation.3">
                   <p:embed/>
                 </p:oleObj>
               </mc:Choice>
@@ -42562,7 +42617,7 @@
           <a:graphicData uri="http://schemas.openxmlformats.org/presentationml/2006/ole">
             <mc:AlternateContent xmlns:mc="http://schemas.openxmlformats.org/markup-compatibility/2006">
               <mc:Choice xmlns:v="urn:schemas-microsoft-com:vml" Requires="v">
-                <p:oleObj spid="_x0000_s49686" name="Формула" r:id="rId31" imgW="393480" imgH="228600" progId="Equation.3">
+                <p:oleObj spid="_x0000_s49761" name="Формула" r:id="rId31" imgW="393480" imgH="228600" progId="Equation.3">
                   <p:embed/>
                 </p:oleObj>
               </mc:Choice>

</xml_diff>